<commit_message>
Update Capstone Project 2021.pptx
</commit_message>
<xml_diff>
--- a/Capstone Project 2021.pptx
+++ b/Capstone Project 2021.pptx
@@ -2,7 +2,7 @@
 <file path=ppt/presentation.xml><?xml version="1.0" encoding="utf-8"?>
 <p:presentation xmlns:a="http://schemas.openxmlformats.org/drawingml/2006/main" xmlns:r="http://schemas.openxmlformats.org/officeDocument/2006/relationships" xmlns:p="http://schemas.openxmlformats.org/presentationml/2006/main" saveSubsetFonts="1">
   <p:sldMasterIdLst>
-    <p:sldMasterId id="2147483773" r:id="rId1"/>
+    <p:sldMasterId id="2147483807" r:id="rId1"/>
   </p:sldMasterIdLst>
   <p:sldIdLst>
     <p:sldId id="256" r:id="rId2"/>
@@ -11,13 +11,16 @@
     <p:sldId id="259" r:id="rId5"/>
     <p:sldId id="260" r:id="rId6"/>
     <p:sldId id="261" r:id="rId7"/>
-    <p:sldId id="262" r:id="rId8"/>
-    <p:sldId id="263" r:id="rId9"/>
-    <p:sldId id="264" r:id="rId10"/>
-    <p:sldId id="265" r:id="rId11"/>
-    <p:sldId id="266" r:id="rId12"/>
-    <p:sldId id="267" r:id="rId13"/>
-    <p:sldId id="268" r:id="rId14"/>
+    <p:sldId id="271" r:id="rId8"/>
+    <p:sldId id="262" r:id="rId9"/>
+    <p:sldId id="263" r:id="rId10"/>
+    <p:sldId id="272" r:id="rId11"/>
+    <p:sldId id="273" r:id="rId12"/>
+    <p:sldId id="265" r:id="rId13"/>
+    <p:sldId id="269" r:id="rId14"/>
+    <p:sldId id="270" r:id="rId15"/>
+    <p:sldId id="267" r:id="rId16"/>
+    <p:sldId id="268" r:id="rId17"/>
   </p:sldIdLst>
   <p:sldSz cx="12192000" cy="6858000"/>
   <p:notesSz cx="6858000" cy="9144000"/>
@@ -127,7 +130,7 @@
 <file path=ppt/revisionInfo.xml><?xml version="1.0" encoding="utf-8"?>
 <p1510:revInfo xmlns:a="http://schemas.openxmlformats.org/drawingml/2006/main" xmlns:r="http://schemas.openxmlformats.org/officeDocument/2006/relationships" xmlns:p1510="http://schemas.microsoft.com/office/powerpoint/2015/10/main">
   <p1510:revLst>
-    <p1510:client id="{D426A5C3-16BC-459B-8B24-6227DC7E5B5C}" v="13" dt="2021-06-03T04:13:16.717"/>
+    <p1510:client id="{D426A5C3-16BC-459B-8B24-6227DC7E5B5C}" v="75" dt="2021-06-03T07:24:02.299"/>
   </p1510:revLst>
 </p1510:revInfo>
 </file>
@@ -136,19 +139,19 @@
 <pc:chgInfo xmlns:a="http://schemas.openxmlformats.org/drawingml/2006/main" xmlns:r="http://schemas.openxmlformats.org/officeDocument/2006/relationships" xmlns:ac="http://schemas.microsoft.com/office/drawing/2013/main/command" xmlns:pc="http://schemas.microsoft.com/office/powerpoint/2013/main/command">
   <pc:docChgLst>
     <pc:chgData name="Isaac Low" userId="7480a74fbf43f6b1" providerId="LiveId" clId="{D426A5C3-16BC-459B-8B24-6227DC7E5B5C}"/>
-    <pc:docChg chg="undo custSel addSld modSld">
-      <pc:chgData name="Isaac Low" userId="7480a74fbf43f6b1" providerId="LiveId" clId="{D426A5C3-16BC-459B-8B24-6227DC7E5B5C}" dt="2021-06-03T04:22:15.788" v="5442"/>
+    <pc:docChg chg="undo redo custSel addSld delSld modSld sldOrd">
+      <pc:chgData name="Isaac Low" userId="7480a74fbf43f6b1" providerId="LiveId" clId="{D426A5C3-16BC-459B-8B24-6227DC7E5B5C}" dt="2021-06-03T07:36:06.815" v="8274" actId="20577"/>
       <pc:docMkLst>
         <pc:docMk/>
       </pc:docMkLst>
       <pc:sldChg chg="addSp delSp modSp new mod setBg addAnim setClrOvrMap delDesignElem">
-        <pc:chgData name="Isaac Low" userId="7480a74fbf43f6b1" providerId="LiveId" clId="{D426A5C3-16BC-459B-8B24-6227DC7E5B5C}" dt="2021-06-03T04:13:39.558" v="5421" actId="26606"/>
+        <pc:chgData name="Isaac Low" userId="7480a74fbf43f6b1" providerId="LiveId" clId="{D426A5C3-16BC-459B-8B24-6227DC7E5B5C}" dt="2021-06-03T05:58:21.238" v="6819" actId="20577"/>
         <pc:sldMkLst>
           <pc:docMk/>
           <pc:sldMk cId="1346450560" sldId="256"/>
         </pc:sldMkLst>
         <pc:spChg chg="mod ord">
-          <ac:chgData name="Isaac Low" userId="7480a74fbf43f6b1" providerId="LiveId" clId="{D426A5C3-16BC-459B-8B24-6227DC7E5B5C}" dt="2021-06-03T04:13:39.558" v="5421" actId="26606"/>
+          <ac:chgData name="Isaac Low" userId="7480a74fbf43f6b1" providerId="LiveId" clId="{D426A5C3-16BC-459B-8B24-6227DC7E5B5C}" dt="2021-06-03T05:58:21.238" v="6819" actId="20577"/>
           <ac:spMkLst>
             <pc:docMk/>
             <pc:sldMk cId="1346450560" sldId="256"/>
@@ -379,16 +382,16 @@
             <ac:spMk id="65" creationId="{1310EFE2-B91D-47E7-B117-C2A802800A7C}"/>
           </ac:spMkLst>
         </pc:spChg>
-        <pc:spChg chg="add">
-          <ac:chgData name="Isaac Low" userId="7480a74fbf43f6b1" providerId="LiveId" clId="{D426A5C3-16BC-459B-8B24-6227DC7E5B5C}" dt="2021-06-03T04:13:39.558" v="5421" actId="26606"/>
+        <pc:spChg chg="add del">
+          <ac:chgData name="Isaac Low" userId="7480a74fbf43f6b1" providerId="LiveId" clId="{D426A5C3-16BC-459B-8B24-6227DC7E5B5C}" dt="2021-06-03T04:44:06.433" v="5857"/>
           <ac:spMkLst>
             <pc:docMk/>
             <pc:sldMk cId="1346450560" sldId="256"/>
             <ac:spMk id="67" creationId="{57ABABA7-0420-4200-9B65-1C1967CE9373}"/>
           </ac:spMkLst>
         </pc:spChg>
-        <pc:spChg chg="add">
-          <ac:chgData name="Isaac Low" userId="7480a74fbf43f6b1" providerId="LiveId" clId="{D426A5C3-16BC-459B-8B24-6227DC7E5B5C}" dt="2021-06-03T04:13:39.558" v="5421" actId="26606"/>
+        <pc:spChg chg="add del">
+          <ac:chgData name="Isaac Low" userId="7480a74fbf43f6b1" providerId="LiveId" clId="{D426A5C3-16BC-459B-8B24-6227DC7E5B5C}" dt="2021-06-03T04:44:06.433" v="5857"/>
           <ac:spMkLst>
             <pc:docMk/>
             <pc:sldMk cId="1346450560" sldId="256"/>
@@ -435,8 +438,8 @@
             <ac:cxnSpMk id="54" creationId="{34D43EC1-35FA-4FC3-8526-F655CEB09D9C}"/>
           </ac:cxnSpMkLst>
         </pc:cxnChg>
-        <pc:cxnChg chg="add">
-          <ac:chgData name="Isaac Low" userId="7480a74fbf43f6b1" providerId="LiveId" clId="{D426A5C3-16BC-459B-8B24-6227DC7E5B5C}" dt="2021-06-03T04:13:39.558" v="5421" actId="26606"/>
+        <pc:cxnChg chg="add del">
+          <ac:chgData name="Isaac Low" userId="7480a74fbf43f6b1" providerId="LiveId" clId="{D426A5C3-16BC-459B-8B24-6227DC7E5B5C}" dt="2021-06-03T04:44:06.433" v="5857"/>
           <ac:cxnSpMkLst>
             <pc:docMk/>
             <pc:sldMk cId="1346450560" sldId="256"/>
@@ -445,13 +448,13 @@
         </pc:cxnChg>
       </pc:sldChg>
       <pc:sldChg chg="modSp new mod">
-        <pc:chgData name="Isaac Low" userId="7480a74fbf43f6b1" providerId="LiveId" clId="{D426A5C3-16BC-459B-8B24-6227DC7E5B5C}" dt="2021-06-03T04:13:16.717" v="5408"/>
+        <pc:chgData name="Isaac Low" userId="7480a74fbf43f6b1" providerId="LiveId" clId="{D426A5C3-16BC-459B-8B24-6227DC7E5B5C}" dt="2021-06-03T04:44:10.801" v="5858"/>
         <pc:sldMkLst>
           <pc:docMk/>
           <pc:sldMk cId="1413400137" sldId="257"/>
         </pc:sldMkLst>
         <pc:spChg chg="mod">
-          <ac:chgData name="Isaac Low" userId="7480a74fbf43f6b1" providerId="LiveId" clId="{D426A5C3-16BC-459B-8B24-6227DC7E5B5C}" dt="2021-06-03T04:13:16.717" v="5408"/>
+          <ac:chgData name="Isaac Low" userId="7480a74fbf43f6b1" providerId="LiveId" clId="{D426A5C3-16BC-459B-8B24-6227DC7E5B5C}" dt="2021-06-03T04:44:10.801" v="5858"/>
           <ac:spMkLst>
             <pc:docMk/>
             <pc:sldMk cId="1413400137" sldId="257"/>
@@ -459,7 +462,7 @@
           </ac:spMkLst>
         </pc:spChg>
         <pc:spChg chg="mod">
-          <ac:chgData name="Isaac Low" userId="7480a74fbf43f6b1" providerId="LiveId" clId="{D426A5C3-16BC-459B-8B24-6227DC7E5B5C}" dt="2021-06-03T04:13:16.717" v="5408"/>
+          <ac:chgData name="Isaac Low" userId="7480a74fbf43f6b1" providerId="LiveId" clId="{D426A5C3-16BC-459B-8B24-6227DC7E5B5C}" dt="2021-06-03T04:44:10.801" v="5858"/>
           <ac:spMkLst>
             <pc:docMk/>
             <pc:sldMk cId="1413400137" sldId="257"/>
@@ -467,14 +470,14 @@
           </ac:spMkLst>
         </pc:spChg>
       </pc:sldChg>
-      <pc:sldChg chg="modSp new mod">
-        <pc:chgData name="Isaac Low" userId="7480a74fbf43f6b1" providerId="LiveId" clId="{D426A5C3-16BC-459B-8B24-6227DC7E5B5C}" dt="2021-06-03T04:13:16.717" v="5408"/>
+      <pc:sldChg chg="modSp new mod ord">
+        <pc:chgData name="Isaac Low" userId="7480a74fbf43f6b1" providerId="LiveId" clId="{D426A5C3-16BC-459B-8B24-6227DC7E5B5C}" dt="2021-06-03T07:24:42.720" v="7507" actId="20577"/>
         <pc:sldMkLst>
           <pc:docMk/>
           <pc:sldMk cId="1287661203" sldId="258"/>
         </pc:sldMkLst>
         <pc:spChg chg="mod">
-          <ac:chgData name="Isaac Low" userId="7480a74fbf43f6b1" providerId="LiveId" clId="{D426A5C3-16BC-459B-8B24-6227DC7E5B5C}" dt="2021-06-03T04:13:16.717" v="5408"/>
+          <ac:chgData name="Isaac Low" userId="7480a74fbf43f6b1" providerId="LiveId" clId="{D426A5C3-16BC-459B-8B24-6227DC7E5B5C}" dt="2021-06-03T04:44:10.801" v="5858"/>
           <ac:spMkLst>
             <pc:docMk/>
             <pc:sldMk cId="1287661203" sldId="258"/>
@@ -482,7 +485,7 @@
           </ac:spMkLst>
         </pc:spChg>
         <pc:spChg chg="mod">
-          <ac:chgData name="Isaac Low" userId="7480a74fbf43f6b1" providerId="LiveId" clId="{D426A5C3-16BC-459B-8B24-6227DC7E5B5C}" dt="2021-06-03T04:13:16.717" v="5408"/>
+          <ac:chgData name="Isaac Low" userId="7480a74fbf43f6b1" providerId="LiveId" clId="{D426A5C3-16BC-459B-8B24-6227DC7E5B5C}" dt="2021-06-03T07:24:42.720" v="7507" actId="20577"/>
           <ac:spMkLst>
             <pc:docMk/>
             <pc:sldMk cId="1287661203" sldId="258"/>
@@ -491,13 +494,13 @@
         </pc:spChg>
       </pc:sldChg>
       <pc:sldChg chg="modSp new mod">
-        <pc:chgData name="Isaac Low" userId="7480a74fbf43f6b1" providerId="LiveId" clId="{D426A5C3-16BC-459B-8B24-6227DC7E5B5C}" dt="2021-06-03T04:13:16.717" v="5408"/>
+        <pc:chgData name="Isaac Low" userId="7480a74fbf43f6b1" providerId="LiveId" clId="{D426A5C3-16BC-459B-8B24-6227DC7E5B5C}" dt="2021-06-03T06:08:50.055" v="7199" actId="27636"/>
         <pc:sldMkLst>
           <pc:docMk/>
           <pc:sldMk cId="1597611348" sldId="259"/>
         </pc:sldMkLst>
         <pc:spChg chg="mod">
-          <ac:chgData name="Isaac Low" userId="7480a74fbf43f6b1" providerId="LiveId" clId="{D426A5C3-16BC-459B-8B24-6227DC7E5B5C}" dt="2021-06-03T04:13:16.717" v="5408"/>
+          <ac:chgData name="Isaac Low" userId="7480a74fbf43f6b1" providerId="LiveId" clId="{D426A5C3-16BC-459B-8B24-6227DC7E5B5C}" dt="2021-06-03T04:44:10.801" v="5858"/>
           <ac:spMkLst>
             <pc:docMk/>
             <pc:sldMk cId="1597611348" sldId="259"/>
@@ -505,7 +508,7 @@
           </ac:spMkLst>
         </pc:spChg>
         <pc:spChg chg="mod">
-          <ac:chgData name="Isaac Low" userId="7480a74fbf43f6b1" providerId="LiveId" clId="{D426A5C3-16BC-459B-8B24-6227DC7E5B5C}" dt="2021-06-03T04:13:16.717" v="5408"/>
+          <ac:chgData name="Isaac Low" userId="7480a74fbf43f6b1" providerId="LiveId" clId="{D426A5C3-16BC-459B-8B24-6227DC7E5B5C}" dt="2021-06-03T06:08:50.055" v="7199" actId="27636"/>
           <ac:spMkLst>
             <pc:docMk/>
             <pc:sldMk cId="1597611348" sldId="259"/>
@@ -513,37 +516,53 @@
           </ac:spMkLst>
         </pc:spChg>
       </pc:sldChg>
-      <pc:sldChg chg="modSp new mod">
-        <pc:chgData name="Isaac Low" userId="7480a74fbf43f6b1" providerId="LiveId" clId="{D426A5C3-16BC-459B-8B24-6227DC7E5B5C}" dt="2021-06-03T04:13:16.717" v="5408"/>
+      <pc:sldChg chg="addSp delSp modSp new mod chgLayout">
+        <pc:chgData name="Isaac Low" userId="7480a74fbf43f6b1" providerId="LiveId" clId="{D426A5C3-16BC-459B-8B24-6227DC7E5B5C}" dt="2021-06-03T05:54:25.368" v="6720" actId="20577"/>
         <pc:sldMkLst>
           <pc:docMk/>
           <pc:sldMk cId="2854986470" sldId="260"/>
         </pc:sldMkLst>
-        <pc:spChg chg="mod">
-          <ac:chgData name="Isaac Low" userId="7480a74fbf43f6b1" providerId="LiveId" clId="{D426A5C3-16BC-459B-8B24-6227DC7E5B5C}" dt="2021-06-03T04:13:16.717" v="5408"/>
+        <pc:spChg chg="mod ord">
+          <ac:chgData name="Isaac Low" userId="7480a74fbf43f6b1" providerId="LiveId" clId="{D426A5C3-16BC-459B-8B24-6227DC7E5B5C}" dt="2021-06-03T05:54:22.366" v="6718" actId="6264"/>
           <ac:spMkLst>
             <pc:docMk/>
             <pc:sldMk cId="2854986470" sldId="260"/>
             <ac:spMk id="2" creationId="{06844C44-3675-43DC-8592-4202DE50ACCC}"/>
           </ac:spMkLst>
         </pc:spChg>
-        <pc:spChg chg="mod">
-          <ac:chgData name="Isaac Low" userId="7480a74fbf43f6b1" providerId="LiveId" clId="{D426A5C3-16BC-459B-8B24-6227DC7E5B5C}" dt="2021-06-03T04:13:16.717" v="5408"/>
+        <pc:spChg chg="mod ord">
+          <ac:chgData name="Isaac Low" userId="7480a74fbf43f6b1" providerId="LiveId" clId="{D426A5C3-16BC-459B-8B24-6227DC7E5B5C}" dt="2021-06-03T05:54:25.368" v="6720" actId="20577"/>
           <ac:spMkLst>
             <pc:docMk/>
             <pc:sldMk cId="2854986470" sldId="260"/>
             <ac:spMk id="3" creationId="{F1142356-254B-4420-98BC-2D8AACCFA737}"/>
           </ac:spMkLst>
         </pc:spChg>
+        <pc:spChg chg="add del mod">
+          <ac:chgData name="Isaac Low" userId="7480a74fbf43f6b1" providerId="LiveId" clId="{D426A5C3-16BC-459B-8B24-6227DC7E5B5C}" dt="2021-06-03T05:54:22.366" v="6718" actId="6264"/>
+          <ac:spMkLst>
+            <pc:docMk/>
+            <pc:sldMk cId="2854986470" sldId="260"/>
+            <ac:spMk id="4" creationId="{5726733B-032A-4BCC-B044-9F74922C2988}"/>
+          </ac:spMkLst>
+        </pc:spChg>
+        <pc:spChg chg="add del mod">
+          <ac:chgData name="Isaac Low" userId="7480a74fbf43f6b1" providerId="LiveId" clId="{D426A5C3-16BC-459B-8B24-6227DC7E5B5C}" dt="2021-06-03T05:54:22.366" v="6718" actId="6264"/>
+          <ac:spMkLst>
+            <pc:docMk/>
+            <pc:sldMk cId="2854986470" sldId="260"/>
+            <ac:spMk id="5" creationId="{B2C0EF6F-43D3-4CDB-866C-78D95567FD76}"/>
+          </ac:spMkLst>
+        </pc:spChg>
       </pc:sldChg>
       <pc:sldChg chg="modSp new mod">
-        <pc:chgData name="Isaac Low" userId="7480a74fbf43f6b1" providerId="LiveId" clId="{D426A5C3-16BC-459B-8B24-6227DC7E5B5C}" dt="2021-06-03T04:13:16.717" v="5408"/>
+        <pc:chgData name="Isaac Low" userId="7480a74fbf43f6b1" providerId="LiveId" clId="{D426A5C3-16BC-459B-8B24-6227DC7E5B5C}" dt="2021-06-03T06:08:02.824" v="7132" actId="20577"/>
         <pc:sldMkLst>
           <pc:docMk/>
           <pc:sldMk cId="4219432369" sldId="261"/>
         </pc:sldMkLst>
         <pc:spChg chg="mod">
-          <ac:chgData name="Isaac Low" userId="7480a74fbf43f6b1" providerId="LiveId" clId="{D426A5C3-16BC-459B-8B24-6227DC7E5B5C}" dt="2021-06-03T04:13:16.717" v="5408"/>
+          <ac:chgData name="Isaac Low" userId="7480a74fbf43f6b1" providerId="LiveId" clId="{D426A5C3-16BC-459B-8B24-6227DC7E5B5C}" dt="2021-06-03T04:44:10.801" v="5858"/>
           <ac:spMkLst>
             <pc:docMk/>
             <pc:sldMk cId="4219432369" sldId="261"/>
@@ -551,7 +570,7 @@
           </ac:spMkLst>
         </pc:spChg>
         <pc:spChg chg="mod">
-          <ac:chgData name="Isaac Low" userId="7480a74fbf43f6b1" providerId="LiveId" clId="{D426A5C3-16BC-459B-8B24-6227DC7E5B5C}" dt="2021-06-03T04:13:16.717" v="5408"/>
+          <ac:chgData name="Isaac Low" userId="7480a74fbf43f6b1" providerId="LiveId" clId="{D426A5C3-16BC-459B-8B24-6227DC7E5B5C}" dt="2021-06-03T06:08:02.824" v="7132" actId="20577"/>
           <ac:spMkLst>
             <pc:docMk/>
             <pc:sldMk cId="4219432369" sldId="261"/>
@@ -559,14 +578,14 @@
           </ac:spMkLst>
         </pc:spChg>
       </pc:sldChg>
-      <pc:sldChg chg="modSp new mod">
-        <pc:chgData name="Isaac Low" userId="7480a74fbf43f6b1" providerId="LiveId" clId="{D426A5C3-16BC-459B-8B24-6227DC7E5B5C}" dt="2021-06-03T04:13:16.717" v="5408"/>
+      <pc:sldChg chg="addSp delSp modSp new mod">
+        <pc:chgData name="Isaac Low" userId="7480a74fbf43f6b1" providerId="LiveId" clId="{D426A5C3-16BC-459B-8B24-6227DC7E5B5C}" dt="2021-06-03T06:19:57.567" v="7386" actId="20577"/>
         <pc:sldMkLst>
           <pc:docMk/>
           <pc:sldMk cId="2505818061" sldId="262"/>
         </pc:sldMkLst>
         <pc:spChg chg="mod">
-          <ac:chgData name="Isaac Low" userId="7480a74fbf43f6b1" providerId="LiveId" clId="{D426A5C3-16BC-459B-8B24-6227DC7E5B5C}" dt="2021-06-03T04:13:16.717" v="5408"/>
+          <ac:chgData name="Isaac Low" userId="7480a74fbf43f6b1" providerId="LiveId" clId="{D426A5C3-16BC-459B-8B24-6227DC7E5B5C}" dt="2021-06-03T04:44:10.801" v="5858"/>
           <ac:spMkLst>
             <pc:docMk/>
             <pc:sldMk cId="2505818061" sldId="262"/>
@@ -574,22 +593,46 @@
           </ac:spMkLst>
         </pc:spChg>
         <pc:spChg chg="mod">
-          <ac:chgData name="Isaac Low" userId="7480a74fbf43f6b1" providerId="LiveId" clId="{D426A5C3-16BC-459B-8B24-6227DC7E5B5C}" dt="2021-06-03T04:13:16.717" v="5408"/>
+          <ac:chgData name="Isaac Low" userId="7480a74fbf43f6b1" providerId="LiveId" clId="{D426A5C3-16BC-459B-8B24-6227DC7E5B5C}" dt="2021-06-03T06:19:57.567" v="7386" actId="20577"/>
           <ac:spMkLst>
             <pc:docMk/>
             <pc:sldMk cId="2505818061" sldId="262"/>
             <ac:spMk id="3" creationId="{E51F004A-2C7F-4E04-BA2C-6B46B2598D5A}"/>
           </ac:spMkLst>
         </pc:spChg>
+        <pc:spChg chg="add del">
+          <ac:chgData name="Isaac Low" userId="7480a74fbf43f6b1" providerId="LiveId" clId="{D426A5C3-16BC-459B-8B24-6227DC7E5B5C}" dt="2021-06-03T06:04:55.714" v="6890"/>
+          <ac:spMkLst>
+            <pc:docMk/>
+            <pc:sldMk cId="2505818061" sldId="262"/>
+            <ac:spMk id="4" creationId="{A18A58AC-F169-4668-98BD-E32ABF772551}"/>
+          </ac:spMkLst>
+        </pc:spChg>
+        <pc:spChg chg="add del">
+          <ac:chgData name="Isaac Low" userId="7480a74fbf43f6b1" providerId="LiveId" clId="{D426A5C3-16BC-459B-8B24-6227DC7E5B5C}" dt="2021-06-03T06:04:57.951" v="6892"/>
+          <ac:spMkLst>
+            <pc:docMk/>
+            <pc:sldMk cId="2505818061" sldId="262"/>
+            <ac:spMk id="5" creationId="{16DE173F-C482-4DB0-8452-479508BE1D8B}"/>
+          </ac:spMkLst>
+        </pc:spChg>
+        <pc:spChg chg="add del">
+          <ac:chgData name="Isaac Low" userId="7480a74fbf43f6b1" providerId="LiveId" clId="{D426A5C3-16BC-459B-8B24-6227DC7E5B5C}" dt="2021-06-03T06:05:03.748" v="6894"/>
+          <ac:spMkLst>
+            <pc:docMk/>
+            <pc:sldMk cId="2505818061" sldId="262"/>
+            <ac:spMk id="6" creationId="{20F62B61-C569-4B65-B0CA-5A6861ABD487}"/>
+          </ac:spMkLst>
+        </pc:spChg>
       </pc:sldChg>
       <pc:sldChg chg="addSp modSp new mod">
-        <pc:chgData name="Isaac Low" userId="7480a74fbf43f6b1" providerId="LiveId" clId="{D426A5C3-16BC-459B-8B24-6227DC7E5B5C}" dt="2021-06-03T04:13:16.717" v="5408"/>
+        <pc:chgData name="Isaac Low" userId="7480a74fbf43f6b1" providerId="LiveId" clId="{D426A5C3-16BC-459B-8B24-6227DC7E5B5C}" dt="2021-06-03T07:24:19.650" v="7504" actId="20577"/>
         <pc:sldMkLst>
           <pc:docMk/>
           <pc:sldMk cId="463234992" sldId="263"/>
         </pc:sldMkLst>
         <pc:spChg chg="mod">
-          <ac:chgData name="Isaac Low" userId="7480a74fbf43f6b1" providerId="LiveId" clId="{D426A5C3-16BC-459B-8B24-6227DC7E5B5C}" dt="2021-06-03T04:13:16.717" v="5408"/>
+          <ac:chgData name="Isaac Low" userId="7480a74fbf43f6b1" providerId="LiveId" clId="{D426A5C3-16BC-459B-8B24-6227DC7E5B5C}" dt="2021-06-03T04:44:10.801" v="5858"/>
           <ac:spMkLst>
             <pc:docMk/>
             <pc:sldMk cId="463234992" sldId="263"/>
@@ -597,7 +640,7 @@
           </ac:spMkLst>
         </pc:spChg>
         <pc:spChg chg="mod">
-          <ac:chgData name="Isaac Low" userId="7480a74fbf43f6b1" providerId="LiveId" clId="{D426A5C3-16BC-459B-8B24-6227DC7E5B5C}" dt="2021-06-03T03:50:15.142" v="2950" actId="14100"/>
+          <ac:chgData name="Isaac Low" userId="7480a74fbf43f6b1" providerId="LiveId" clId="{D426A5C3-16BC-459B-8B24-6227DC7E5B5C}" dt="2021-06-03T07:24:19.650" v="7504" actId="20577"/>
           <ac:spMkLst>
             <pc:docMk/>
             <pc:sldMk cId="463234992" sldId="263"/>
@@ -605,7 +648,7 @@
           </ac:spMkLst>
         </pc:spChg>
         <pc:picChg chg="add mod">
-          <ac:chgData name="Isaac Low" userId="7480a74fbf43f6b1" providerId="LiveId" clId="{D426A5C3-16BC-459B-8B24-6227DC7E5B5C}" dt="2021-06-03T03:51:05.067" v="2953" actId="14100"/>
+          <ac:chgData name="Isaac Low" userId="7480a74fbf43f6b1" providerId="LiveId" clId="{D426A5C3-16BC-459B-8B24-6227DC7E5B5C}" dt="2021-06-03T06:20:24.589" v="7422" actId="1076"/>
           <ac:picMkLst>
             <pc:docMk/>
             <pc:sldMk cId="463234992" sldId="263"/>
@@ -613,14 +656,14 @@
           </ac:picMkLst>
         </pc:picChg>
       </pc:sldChg>
-      <pc:sldChg chg="addSp delSp modSp new mod setBg">
-        <pc:chgData name="Isaac Low" userId="7480a74fbf43f6b1" providerId="LiveId" clId="{D426A5C3-16BC-459B-8B24-6227DC7E5B5C}" dt="2021-06-03T04:13:16.717" v="5408"/>
+      <pc:sldChg chg="addSp delSp modSp new del mod setBg">
+        <pc:chgData name="Isaac Low" userId="7480a74fbf43f6b1" providerId="LiveId" clId="{D426A5C3-16BC-459B-8B24-6227DC7E5B5C}" dt="2021-06-03T07:25:13.361" v="7508" actId="2696"/>
         <pc:sldMkLst>
           <pc:docMk/>
           <pc:sldMk cId="559979042" sldId="264"/>
         </pc:sldMkLst>
         <pc:spChg chg="mod">
-          <ac:chgData name="Isaac Low" userId="7480a74fbf43f6b1" providerId="LiveId" clId="{D426A5C3-16BC-459B-8B24-6227DC7E5B5C}" dt="2021-06-03T04:13:16.717" v="5408"/>
+          <ac:chgData name="Isaac Low" userId="7480a74fbf43f6b1" providerId="LiveId" clId="{D426A5C3-16BC-459B-8B24-6227DC7E5B5C}" dt="2021-06-03T04:44:10.801" v="5858"/>
           <ac:spMkLst>
             <pc:docMk/>
             <pc:sldMk cId="559979042" sldId="264"/>
@@ -660,7 +703,7 @@
           </ac:spMkLst>
         </pc:spChg>
         <pc:picChg chg="add mod ord">
-          <ac:chgData name="Isaac Low" userId="7480a74fbf43f6b1" providerId="LiveId" clId="{D426A5C3-16BC-459B-8B24-6227DC7E5B5C}" dt="2021-06-03T04:13:16.717" v="5408"/>
+          <ac:chgData name="Isaac Low" userId="7480a74fbf43f6b1" providerId="LiveId" clId="{D426A5C3-16BC-459B-8B24-6227DC7E5B5C}" dt="2021-06-03T04:26:13.808" v="5456" actId="14100"/>
           <ac:picMkLst>
             <pc:docMk/>
             <pc:sldMk cId="559979042" sldId="264"/>
@@ -669,13 +712,13 @@
         </pc:picChg>
       </pc:sldChg>
       <pc:sldChg chg="modSp new mod">
-        <pc:chgData name="Isaac Low" userId="7480a74fbf43f6b1" providerId="LiveId" clId="{D426A5C3-16BC-459B-8B24-6227DC7E5B5C}" dt="2021-06-03T04:13:16.717" v="5408"/>
+        <pc:chgData name="Isaac Low" userId="7480a74fbf43f6b1" providerId="LiveId" clId="{D426A5C3-16BC-459B-8B24-6227DC7E5B5C}" dt="2021-06-03T07:28:32.837" v="8036" actId="20577"/>
         <pc:sldMkLst>
           <pc:docMk/>
           <pc:sldMk cId="2126947556" sldId="265"/>
         </pc:sldMkLst>
         <pc:spChg chg="mod">
-          <ac:chgData name="Isaac Low" userId="7480a74fbf43f6b1" providerId="LiveId" clId="{D426A5C3-16BC-459B-8B24-6227DC7E5B5C}" dt="2021-06-03T04:13:16.717" v="5408"/>
+          <ac:chgData name="Isaac Low" userId="7480a74fbf43f6b1" providerId="LiveId" clId="{D426A5C3-16BC-459B-8B24-6227DC7E5B5C}" dt="2021-06-03T04:44:10.801" v="5858"/>
           <ac:spMkLst>
             <pc:docMk/>
             <pc:sldMk cId="2126947556" sldId="265"/>
@@ -683,7 +726,7 @@
           </ac:spMkLst>
         </pc:spChg>
         <pc:spChg chg="mod">
-          <ac:chgData name="Isaac Low" userId="7480a74fbf43f6b1" providerId="LiveId" clId="{D426A5C3-16BC-459B-8B24-6227DC7E5B5C}" dt="2021-06-03T04:13:16.717" v="5408"/>
+          <ac:chgData name="Isaac Low" userId="7480a74fbf43f6b1" providerId="LiveId" clId="{D426A5C3-16BC-459B-8B24-6227DC7E5B5C}" dt="2021-06-03T07:28:32.837" v="8036" actId="20577"/>
           <ac:spMkLst>
             <pc:docMk/>
             <pc:sldMk cId="2126947556" sldId="265"/>
@@ -691,14 +734,14 @@
           </ac:spMkLst>
         </pc:spChg>
       </pc:sldChg>
-      <pc:sldChg chg="modSp new mod">
-        <pc:chgData name="Isaac Low" userId="7480a74fbf43f6b1" providerId="LiveId" clId="{D426A5C3-16BC-459B-8B24-6227DC7E5B5C}" dt="2021-06-03T04:13:16.717" v="5408"/>
+      <pc:sldChg chg="modSp new del mod">
+        <pc:chgData name="Isaac Low" userId="7480a74fbf43f6b1" providerId="LiveId" clId="{D426A5C3-16BC-459B-8B24-6227DC7E5B5C}" dt="2021-06-03T07:25:41.368" v="7514" actId="2696"/>
         <pc:sldMkLst>
           <pc:docMk/>
           <pc:sldMk cId="1656088696" sldId="266"/>
         </pc:sldMkLst>
         <pc:spChg chg="mod">
-          <ac:chgData name="Isaac Low" userId="7480a74fbf43f6b1" providerId="LiveId" clId="{D426A5C3-16BC-459B-8B24-6227DC7E5B5C}" dt="2021-06-03T04:13:16.717" v="5408"/>
+          <ac:chgData name="Isaac Low" userId="7480a74fbf43f6b1" providerId="LiveId" clId="{D426A5C3-16BC-459B-8B24-6227DC7E5B5C}" dt="2021-06-03T04:44:10.801" v="5858"/>
           <ac:spMkLst>
             <pc:docMk/>
             <pc:sldMk cId="1656088696" sldId="266"/>
@@ -706,7 +749,7 @@
           </ac:spMkLst>
         </pc:spChg>
         <pc:spChg chg="mod">
-          <ac:chgData name="Isaac Low" userId="7480a74fbf43f6b1" providerId="LiveId" clId="{D426A5C3-16BC-459B-8B24-6227DC7E5B5C}" dt="2021-06-03T04:13:16.717" v="5408"/>
+          <ac:chgData name="Isaac Low" userId="7480a74fbf43f6b1" providerId="LiveId" clId="{D426A5C3-16BC-459B-8B24-6227DC7E5B5C}" dt="2021-06-03T04:44:10.801" v="5858"/>
           <ac:spMkLst>
             <pc:docMk/>
             <pc:sldMk cId="1656088696" sldId="266"/>
@@ -715,13 +758,13 @@
         </pc:spChg>
       </pc:sldChg>
       <pc:sldChg chg="modSp new mod">
-        <pc:chgData name="Isaac Low" userId="7480a74fbf43f6b1" providerId="LiveId" clId="{D426A5C3-16BC-459B-8B24-6227DC7E5B5C}" dt="2021-06-03T04:13:16.717" v="5408"/>
+        <pc:chgData name="Isaac Low" userId="7480a74fbf43f6b1" providerId="LiveId" clId="{D426A5C3-16BC-459B-8B24-6227DC7E5B5C}" dt="2021-06-03T04:44:10.801" v="5858"/>
         <pc:sldMkLst>
           <pc:docMk/>
           <pc:sldMk cId="443828993" sldId="267"/>
         </pc:sldMkLst>
         <pc:spChg chg="mod">
-          <ac:chgData name="Isaac Low" userId="7480a74fbf43f6b1" providerId="LiveId" clId="{D426A5C3-16BC-459B-8B24-6227DC7E5B5C}" dt="2021-06-03T04:13:16.717" v="5408"/>
+          <ac:chgData name="Isaac Low" userId="7480a74fbf43f6b1" providerId="LiveId" clId="{D426A5C3-16BC-459B-8B24-6227DC7E5B5C}" dt="2021-06-03T04:44:10.801" v="5858"/>
           <ac:spMkLst>
             <pc:docMk/>
             <pc:sldMk cId="443828993" sldId="267"/>
@@ -729,7 +772,7 @@
           </ac:spMkLst>
         </pc:spChg>
         <pc:spChg chg="mod">
-          <ac:chgData name="Isaac Low" userId="7480a74fbf43f6b1" providerId="LiveId" clId="{D426A5C3-16BC-459B-8B24-6227DC7E5B5C}" dt="2021-06-03T04:13:16.717" v="5408"/>
+          <ac:chgData name="Isaac Low" userId="7480a74fbf43f6b1" providerId="LiveId" clId="{D426A5C3-16BC-459B-8B24-6227DC7E5B5C}" dt="2021-06-03T04:44:10.801" v="5858"/>
           <ac:spMkLst>
             <pc:docMk/>
             <pc:sldMk cId="443828993" sldId="267"/>
@@ -738,13 +781,13 @@
         </pc:spChg>
       </pc:sldChg>
       <pc:sldChg chg="modSp new mod">
-        <pc:chgData name="Isaac Low" userId="7480a74fbf43f6b1" providerId="LiveId" clId="{D426A5C3-16BC-459B-8B24-6227DC7E5B5C}" dt="2021-06-03T04:22:15.788" v="5442"/>
+        <pc:chgData name="Isaac Low" userId="7480a74fbf43f6b1" providerId="LiveId" clId="{D426A5C3-16BC-459B-8B24-6227DC7E5B5C}" dt="2021-06-03T04:44:10.801" v="5858"/>
         <pc:sldMkLst>
           <pc:docMk/>
           <pc:sldMk cId="3367198734" sldId="268"/>
         </pc:sldMkLst>
         <pc:spChg chg="mod">
-          <ac:chgData name="Isaac Low" userId="7480a74fbf43f6b1" providerId="LiveId" clId="{D426A5C3-16BC-459B-8B24-6227DC7E5B5C}" dt="2021-06-03T04:21:36.683" v="5430" actId="20577"/>
+          <ac:chgData name="Isaac Low" userId="7480a74fbf43f6b1" providerId="LiveId" clId="{D426A5C3-16BC-459B-8B24-6227DC7E5B5C}" dt="2021-06-03T04:44:10.801" v="5858"/>
           <ac:spMkLst>
             <pc:docMk/>
             <pc:sldMk cId="3367198734" sldId="268"/>
@@ -752,13 +795,198 @@
           </ac:spMkLst>
         </pc:spChg>
         <pc:spChg chg="mod">
-          <ac:chgData name="Isaac Low" userId="7480a74fbf43f6b1" providerId="LiveId" clId="{D426A5C3-16BC-459B-8B24-6227DC7E5B5C}" dt="2021-06-03T04:22:15.788" v="5442"/>
+          <ac:chgData name="Isaac Low" userId="7480a74fbf43f6b1" providerId="LiveId" clId="{D426A5C3-16BC-459B-8B24-6227DC7E5B5C}" dt="2021-06-03T04:44:10.801" v="5858"/>
           <ac:spMkLst>
             <pc:docMk/>
             <pc:sldMk cId="3367198734" sldId="268"/>
             <ac:spMk id="3" creationId="{37BA1053-BF24-4BCC-8E70-074EE7484BFD}"/>
           </ac:spMkLst>
         </pc:spChg>
+      </pc:sldChg>
+      <pc:sldChg chg="addSp modSp new mod">
+        <pc:chgData name="Isaac Low" userId="7480a74fbf43f6b1" providerId="LiveId" clId="{D426A5C3-16BC-459B-8B24-6227DC7E5B5C}" dt="2021-06-03T04:44:10.801" v="5858"/>
+        <pc:sldMkLst>
+          <pc:docMk/>
+          <pc:sldMk cId="177021519" sldId="269"/>
+        </pc:sldMkLst>
+        <pc:spChg chg="mod">
+          <ac:chgData name="Isaac Low" userId="7480a74fbf43f6b1" providerId="LiveId" clId="{D426A5C3-16BC-459B-8B24-6227DC7E5B5C}" dt="2021-06-03T04:44:10.801" v="5858"/>
+          <ac:spMkLst>
+            <pc:docMk/>
+            <pc:sldMk cId="177021519" sldId="269"/>
+            <ac:spMk id="2" creationId="{B47218B5-57A8-4C56-8840-68F4437A109D}"/>
+          </ac:spMkLst>
+        </pc:spChg>
+        <pc:spChg chg="mod">
+          <ac:chgData name="Isaac Low" userId="7480a74fbf43f6b1" providerId="LiveId" clId="{D426A5C3-16BC-459B-8B24-6227DC7E5B5C}" dt="2021-06-03T04:44:10.801" v="5858"/>
+          <ac:spMkLst>
+            <pc:docMk/>
+            <pc:sldMk cId="177021519" sldId="269"/>
+            <ac:spMk id="3" creationId="{E9A32212-27C7-4BE4-AB19-84DE9DDE852C}"/>
+          </ac:spMkLst>
+        </pc:spChg>
+        <pc:picChg chg="add mod">
+          <ac:chgData name="Isaac Low" userId="7480a74fbf43f6b1" providerId="LiveId" clId="{D426A5C3-16BC-459B-8B24-6227DC7E5B5C}" dt="2021-06-03T04:43:11.368" v="5847" actId="1076"/>
+          <ac:picMkLst>
+            <pc:docMk/>
+            <pc:sldMk cId="177021519" sldId="269"/>
+            <ac:picMk id="4" creationId="{7D003A06-7944-4568-92C9-289704006293}"/>
+          </ac:picMkLst>
+        </pc:picChg>
+      </pc:sldChg>
+      <pc:sldChg chg="addSp delSp modSp new mod setBg">
+        <pc:chgData name="Isaac Low" userId="7480a74fbf43f6b1" providerId="LiveId" clId="{D426A5C3-16BC-459B-8B24-6227DC7E5B5C}" dt="2021-06-03T07:36:06.815" v="8274" actId="20577"/>
+        <pc:sldMkLst>
+          <pc:docMk/>
+          <pc:sldMk cId="1926305711" sldId="270"/>
+        </pc:sldMkLst>
+        <pc:spChg chg="mod">
+          <ac:chgData name="Isaac Low" userId="7480a74fbf43f6b1" providerId="LiveId" clId="{D426A5C3-16BC-459B-8B24-6227DC7E5B5C}" dt="2021-06-03T04:43:46.782" v="5855" actId="26606"/>
+          <ac:spMkLst>
+            <pc:docMk/>
+            <pc:sldMk cId="1926305711" sldId="270"/>
+            <ac:spMk id="2" creationId="{077AE6DA-578F-4A3D-86B2-61F570813E01}"/>
+          </ac:spMkLst>
+        </pc:spChg>
+        <pc:spChg chg="mod">
+          <ac:chgData name="Isaac Low" userId="7480a74fbf43f6b1" providerId="LiveId" clId="{D426A5C3-16BC-459B-8B24-6227DC7E5B5C}" dt="2021-06-03T07:36:06.815" v="8274" actId="20577"/>
+          <ac:spMkLst>
+            <pc:docMk/>
+            <pc:sldMk cId="1926305711" sldId="270"/>
+            <ac:spMk id="3" creationId="{4F1570F0-CBC9-42BE-9B93-6888DBBF7EB9}"/>
+          </ac:spMkLst>
+        </pc:spChg>
+        <pc:picChg chg="add del mod">
+          <ac:chgData name="Isaac Low" userId="7480a74fbf43f6b1" providerId="LiveId" clId="{D426A5C3-16BC-459B-8B24-6227DC7E5B5C}" dt="2021-06-03T04:43:07.399" v="5845" actId="21"/>
+          <ac:picMkLst>
+            <pc:docMk/>
+            <pc:sldMk cId="1926305711" sldId="270"/>
+            <ac:picMk id="5" creationId="{BE6BD961-95AF-436B-ACCD-1D5BF47FC1DD}"/>
+          </ac:picMkLst>
+        </pc:picChg>
+        <pc:picChg chg="add mod">
+          <ac:chgData name="Isaac Low" userId="7480a74fbf43f6b1" providerId="LiveId" clId="{D426A5C3-16BC-459B-8B24-6227DC7E5B5C}" dt="2021-06-03T04:44:32.631" v="5859" actId="207"/>
+          <ac:picMkLst>
+            <pc:docMk/>
+            <pc:sldMk cId="1926305711" sldId="270"/>
+            <ac:picMk id="1026" creationId="{9358CADE-E6A4-48FD-B70D-B6371D188580}"/>
+          </ac:picMkLst>
+        </pc:picChg>
+      </pc:sldChg>
+      <pc:sldChg chg="addSp modSp new mod">
+        <pc:chgData name="Isaac Low" userId="7480a74fbf43f6b1" providerId="LiveId" clId="{D426A5C3-16BC-459B-8B24-6227DC7E5B5C}" dt="2021-06-03T06:01:01.575" v="6839" actId="1076"/>
+        <pc:sldMkLst>
+          <pc:docMk/>
+          <pc:sldMk cId="811470364" sldId="271"/>
+        </pc:sldMkLst>
+        <pc:spChg chg="mod">
+          <ac:chgData name="Isaac Low" userId="7480a74fbf43f6b1" providerId="LiveId" clId="{D426A5C3-16BC-459B-8B24-6227DC7E5B5C}" dt="2021-06-03T05:59:31.318" v="6837" actId="20577"/>
+          <ac:spMkLst>
+            <pc:docMk/>
+            <pc:sldMk cId="811470364" sldId="271"/>
+            <ac:spMk id="2" creationId="{CA7AC13D-638F-43E0-A0AC-1B2BC52956AB}"/>
+          </ac:spMkLst>
+        </pc:spChg>
+        <pc:picChg chg="add mod">
+          <ac:chgData name="Isaac Low" userId="7480a74fbf43f6b1" providerId="LiveId" clId="{D426A5C3-16BC-459B-8B24-6227DC7E5B5C}" dt="2021-06-03T06:01:01.575" v="6839" actId="1076"/>
+          <ac:picMkLst>
+            <pc:docMk/>
+            <pc:sldMk cId="811470364" sldId="271"/>
+            <ac:picMk id="5" creationId="{F879CB6C-6CFD-4AAE-8390-ACD70E77F386}"/>
+          </ac:picMkLst>
+        </pc:picChg>
+      </pc:sldChg>
+      <pc:sldChg chg="new del">
+        <pc:chgData name="Isaac Low" userId="7480a74fbf43f6b1" providerId="LiveId" clId="{D426A5C3-16BC-459B-8B24-6227DC7E5B5C}" dt="2021-06-03T04:43:19.510" v="5848" actId="2696"/>
+        <pc:sldMkLst>
+          <pc:docMk/>
+          <pc:sldMk cId="2112550141" sldId="271"/>
+        </pc:sldMkLst>
+      </pc:sldChg>
+      <pc:sldChg chg="new del">
+        <pc:chgData name="Isaac Low" userId="7480a74fbf43f6b1" providerId="LiveId" clId="{D426A5C3-16BC-459B-8B24-6227DC7E5B5C}" dt="2021-06-03T04:58:19.144" v="6108" actId="2696"/>
+        <pc:sldMkLst>
+          <pc:docMk/>
+          <pc:sldMk cId="3022972845" sldId="271"/>
+        </pc:sldMkLst>
+      </pc:sldChg>
+      <pc:sldChg chg="addSp modSp new mod">
+        <pc:chgData name="Isaac Low" userId="7480a74fbf43f6b1" providerId="LiveId" clId="{D426A5C3-16BC-459B-8B24-6227DC7E5B5C}" dt="2021-06-03T07:22:46.360" v="7463" actId="20577"/>
+        <pc:sldMkLst>
+          <pc:docMk/>
+          <pc:sldMk cId="2134914763" sldId="272"/>
+        </pc:sldMkLst>
+        <pc:spChg chg="mod">
+          <ac:chgData name="Isaac Low" userId="7480a74fbf43f6b1" providerId="LiveId" clId="{D426A5C3-16BC-459B-8B24-6227DC7E5B5C}" dt="2021-06-03T06:20:34.651" v="7429" actId="20577"/>
+          <ac:spMkLst>
+            <pc:docMk/>
+            <pc:sldMk cId="2134914763" sldId="272"/>
+            <ac:spMk id="2" creationId="{982DB59D-ADAF-4F3B-AE89-1A56F86A9BC3}"/>
+          </ac:spMkLst>
+        </pc:spChg>
+        <pc:spChg chg="mod">
+          <ac:chgData name="Isaac Low" userId="7480a74fbf43f6b1" providerId="LiveId" clId="{D426A5C3-16BC-459B-8B24-6227DC7E5B5C}" dt="2021-06-03T07:22:46.360" v="7463" actId="20577"/>
+          <ac:spMkLst>
+            <pc:docMk/>
+            <pc:sldMk cId="2134914763" sldId="272"/>
+            <ac:spMk id="3" creationId="{19A2E474-769C-439C-90B3-4DA7770006E2}"/>
+          </ac:spMkLst>
+        </pc:spChg>
+        <pc:picChg chg="add mod">
+          <ac:chgData name="Isaac Low" userId="7480a74fbf43f6b1" providerId="LiveId" clId="{D426A5C3-16BC-459B-8B24-6227DC7E5B5C}" dt="2021-06-03T07:22:14.791" v="7448" actId="1076"/>
+          <ac:picMkLst>
+            <pc:docMk/>
+            <pc:sldMk cId="2134914763" sldId="272"/>
+            <ac:picMk id="3074" creationId="{5EAEB53C-D0D3-4F33-AE31-A8C90E4AEDA1}"/>
+          </ac:picMkLst>
+        </pc:picChg>
+      </pc:sldChg>
+      <pc:sldChg chg="addSp delSp modSp new mod">
+        <pc:chgData name="Isaac Low" userId="7480a74fbf43f6b1" providerId="LiveId" clId="{D426A5C3-16BC-459B-8B24-6227DC7E5B5C}" dt="2021-06-03T07:24:02.299" v="7502" actId="1076"/>
+        <pc:sldMkLst>
+          <pc:docMk/>
+          <pc:sldMk cId="3948413117" sldId="273"/>
+        </pc:sldMkLst>
+        <pc:spChg chg="add del mod">
+          <ac:chgData name="Isaac Low" userId="7480a74fbf43f6b1" providerId="LiveId" clId="{D426A5C3-16BC-459B-8B24-6227DC7E5B5C}" dt="2021-06-03T07:23:14.176" v="7474" actId="20577"/>
+          <ac:spMkLst>
+            <pc:docMk/>
+            <pc:sldMk cId="3948413117" sldId="273"/>
+            <ac:spMk id="2" creationId="{BB77A1FA-0807-41B6-9968-8EF7C685A633}"/>
+          </ac:spMkLst>
+        </pc:spChg>
+        <pc:spChg chg="mod">
+          <ac:chgData name="Isaac Low" userId="7480a74fbf43f6b1" providerId="LiveId" clId="{D426A5C3-16BC-459B-8B24-6227DC7E5B5C}" dt="2021-06-03T07:24:00.272" v="7501" actId="1076"/>
+          <ac:spMkLst>
+            <pc:docMk/>
+            <pc:sldMk cId="3948413117" sldId="273"/>
+            <ac:spMk id="3" creationId="{DCDA97B5-D74C-4DFB-9B5B-2C6D8C466AB9}"/>
+          </ac:spMkLst>
+        </pc:spChg>
+        <pc:spChg chg="add del">
+          <ac:chgData name="Isaac Low" userId="7480a74fbf43f6b1" providerId="LiveId" clId="{D426A5C3-16BC-459B-8B24-6227DC7E5B5C}" dt="2021-06-03T07:23:31.887" v="7492"/>
+          <ac:spMkLst>
+            <pc:docMk/>
+            <pc:sldMk cId="3948413117" sldId="273"/>
+            <ac:spMk id="4" creationId="{FFD8AF2A-6031-490F-B7A3-8F76D141F743}"/>
+          </ac:spMkLst>
+        </pc:spChg>
+        <pc:picChg chg="add del mod">
+          <ac:chgData name="Isaac Low" userId="7480a74fbf43f6b1" providerId="LiveId" clId="{D426A5C3-16BC-459B-8B24-6227DC7E5B5C}" dt="2021-06-03T07:23:52.902" v="7498"/>
+          <ac:picMkLst>
+            <pc:docMk/>
+            <pc:sldMk cId="3948413117" sldId="273"/>
+            <ac:picMk id="4099" creationId="{3686818A-123C-49E3-A952-B15B73E0EAA9}"/>
+          </ac:picMkLst>
+        </pc:picChg>
+        <pc:picChg chg="add mod">
+          <ac:chgData name="Isaac Low" userId="7480a74fbf43f6b1" providerId="LiveId" clId="{D426A5C3-16BC-459B-8B24-6227DC7E5B5C}" dt="2021-06-03T07:24:02.299" v="7502" actId="1076"/>
+          <ac:picMkLst>
+            <pc:docMk/>
+            <pc:sldMk cId="3948413117" sldId="273"/>
+            <ac:picMk id="4101" creationId="{D2268CD9-6DBE-4631-A171-EEB856966812}"/>
+          </ac:picMkLst>
+        </pc:picChg>
       </pc:sldChg>
     </pc:docChg>
   </pc:docChgLst>
@@ -1091,7 +1319,7 @@
     </p:spTree>
     <p:extLst>
       <p:ext uri="{BB962C8B-B14F-4D97-AF65-F5344CB8AC3E}">
-        <p14:creationId xmlns:p14="http://schemas.microsoft.com/office/powerpoint/2010/main" val="751131119"/>
+        <p14:creationId xmlns:p14="http://schemas.microsoft.com/office/powerpoint/2010/main" val="2476715717"/>
       </p:ext>
     </p:extLst>
   </p:cSld>
@@ -1429,7 +1657,7 @@
     </p:spTree>
     <p:extLst>
       <p:ext uri="{BB962C8B-B14F-4D97-AF65-F5344CB8AC3E}">
-        <p14:creationId xmlns:p14="http://schemas.microsoft.com/office/powerpoint/2010/main" val="1075909914"/>
+        <p14:creationId xmlns:p14="http://schemas.microsoft.com/office/powerpoint/2010/main" val="300220258"/>
       </p:ext>
     </p:extLst>
   </p:cSld>
@@ -1906,7 +2134,7 @@
     </p:spTree>
     <p:extLst>
       <p:ext uri="{BB962C8B-B14F-4D97-AF65-F5344CB8AC3E}">
-        <p14:creationId xmlns:p14="http://schemas.microsoft.com/office/powerpoint/2010/main" val="1318771491"/>
+        <p14:creationId xmlns:p14="http://schemas.microsoft.com/office/powerpoint/2010/main" val="100204969"/>
       </p:ext>
     </p:extLst>
   </p:cSld>
@@ -2166,7 +2394,7 @@
     </p:spTree>
     <p:extLst>
       <p:ext uri="{BB962C8B-B14F-4D97-AF65-F5344CB8AC3E}">
-        <p14:creationId xmlns:p14="http://schemas.microsoft.com/office/powerpoint/2010/main" val="461754442"/>
+        <p14:creationId xmlns:p14="http://schemas.microsoft.com/office/powerpoint/2010/main" val="3864359669"/>
       </p:ext>
     </p:extLst>
   </p:cSld>
@@ -2562,7 +2790,7 @@
     </p:spTree>
     <p:extLst>
       <p:ext uri="{BB962C8B-B14F-4D97-AF65-F5344CB8AC3E}">
-        <p14:creationId xmlns:p14="http://schemas.microsoft.com/office/powerpoint/2010/main" val="3463966392"/>
+        <p14:creationId xmlns:p14="http://schemas.microsoft.com/office/powerpoint/2010/main" val="3027571128"/>
       </p:ext>
     </p:extLst>
   </p:cSld>
@@ -2882,7 +3110,7 @@
     </p:spTree>
     <p:extLst>
       <p:ext uri="{BB962C8B-B14F-4D97-AF65-F5344CB8AC3E}">
-        <p14:creationId xmlns:p14="http://schemas.microsoft.com/office/powerpoint/2010/main" val="236386341"/>
+        <p14:creationId xmlns:p14="http://schemas.microsoft.com/office/powerpoint/2010/main" val="1526583074"/>
       </p:ext>
     </p:extLst>
   </p:cSld>
@@ -3134,7 +3362,7 @@
     </p:spTree>
     <p:extLst>
       <p:ext uri="{BB962C8B-B14F-4D97-AF65-F5344CB8AC3E}">
-        <p14:creationId xmlns:p14="http://schemas.microsoft.com/office/powerpoint/2010/main" val="2975401349"/>
+        <p14:creationId xmlns:p14="http://schemas.microsoft.com/office/powerpoint/2010/main" val="3037912213"/>
       </p:ext>
     </p:extLst>
   </p:cSld>
@@ -3396,7 +3624,7 @@
     </p:spTree>
     <p:extLst>
       <p:ext uri="{BB962C8B-B14F-4D97-AF65-F5344CB8AC3E}">
-        <p14:creationId xmlns:p14="http://schemas.microsoft.com/office/powerpoint/2010/main" val="1286125217"/>
+        <p14:creationId xmlns:p14="http://schemas.microsoft.com/office/powerpoint/2010/main" val="3873766399"/>
       </p:ext>
     </p:extLst>
   </p:cSld>
@@ -3658,7 +3886,7 @@
     </p:spTree>
     <p:extLst>
       <p:ext uri="{BB962C8B-B14F-4D97-AF65-F5344CB8AC3E}">
-        <p14:creationId xmlns:p14="http://schemas.microsoft.com/office/powerpoint/2010/main" val="1126213657"/>
+        <p14:creationId xmlns:p14="http://schemas.microsoft.com/office/powerpoint/2010/main" val="2866058679"/>
       </p:ext>
     </p:extLst>
   </p:cSld>
@@ -3992,7 +4220,7 @@
     </p:spTree>
     <p:extLst>
       <p:ext uri="{BB962C8B-B14F-4D97-AF65-F5344CB8AC3E}">
-        <p14:creationId xmlns:p14="http://schemas.microsoft.com/office/powerpoint/2010/main" val="1902363004"/>
+        <p14:creationId xmlns:p14="http://schemas.microsoft.com/office/powerpoint/2010/main" val="3934529828"/>
       </p:ext>
     </p:extLst>
   </p:cSld>
@@ -4315,7 +4543,7 @@
     </p:spTree>
     <p:extLst>
       <p:ext uri="{BB962C8B-B14F-4D97-AF65-F5344CB8AC3E}">
-        <p14:creationId xmlns:p14="http://schemas.microsoft.com/office/powerpoint/2010/main" val="298141452"/>
+        <p14:creationId xmlns:p14="http://schemas.microsoft.com/office/powerpoint/2010/main" val="3962421156"/>
       </p:ext>
     </p:extLst>
   </p:cSld>
@@ -4772,7 +5000,7 @@
     </p:spTree>
     <p:extLst>
       <p:ext uri="{BB962C8B-B14F-4D97-AF65-F5344CB8AC3E}">
-        <p14:creationId xmlns:p14="http://schemas.microsoft.com/office/powerpoint/2010/main" val="3940671529"/>
+        <p14:creationId xmlns:p14="http://schemas.microsoft.com/office/powerpoint/2010/main" val="1324901321"/>
       </p:ext>
     </p:extLst>
   </p:cSld>
@@ -4972,7 +5200,7 @@
     </p:spTree>
     <p:extLst>
       <p:ext uri="{BB962C8B-B14F-4D97-AF65-F5344CB8AC3E}">
-        <p14:creationId xmlns:p14="http://schemas.microsoft.com/office/powerpoint/2010/main" val="3158776716"/>
+        <p14:creationId xmlns:p14="http://schemas.microsoft.com/office/powerpoint/2010/main" val="4270509661"/>
       </p:ext>
     </p:extLst>
   </p:cSld>
@@ -5149,7 +5377,7 @@
     </p:spTree>
     <p:extLst>
       <p:ext uri="{BB962C8B-B14F-4D97-AF65-F5344CB8AC3E}">
-        <p14:creationId xmlns:p14="http://schemas.microsoft.com/office/powerpoint/2010/main" val="1010530348"/>
+        <p14:creationId xmlns:p14="http://schemas.microsoft.com/office/powerpoint/2010/main" val="1225388716"/>
       </p:ext>
     </p:extLst>
   </p:cSld>
@@ -5482,7 +5710,7 @@
     </p:spTree>
     <p:extLst>
       <p:ext uri="{BB962C8B-B14F-4D97-AF65-F5344CB8AC3E}">
-        <p14:creationId xmlns:p14="http://schemas.microsoft.com/office/powerpoint/2010/main" val="595952328"/>
+        <p14:creationId xmlns:p14="http://schemas.microsoft.com/office/powerpoint/2010/main" val="3248318765"/>
       </p:ext>
     </p:extLst>
   </p:cSld>
@@ -5832,7 +6060,7 @@
     </p:spTree>
     <p:extLst>
       <p:ext uri="{BB962C8B-B14F-4D97-AF65-F5344CB8AC3E}">
-        <p14:creationId xmlns:p14="http://schemas.microsoft.com/office/powerpoint/2010/main" val="2415689295"/>
+        <p14:creationId xmlns:p14="http://schemas.microsoft.com/office/powerpoint/2010/main" val="627777412"/>
       </p:ext>
     </p:extLst>
   </p:cSld>
@@ -7833,28 +8061,28 @@
     </p:spTree>
     <p:extLst>
       <p:ext uri="{BB962C8B-B14F-4D97-AF65-F5344CB8AC3E}">
-        <p14:creationId xmlns:p14="http://schemas.microsoft.com/office/powerpoint/2010/main" val="1487053565"/>
+        <p14:creationId xmlns:p14="http://schemas.microsoft.com/office/powerpoint/2010/main" val="1553290650"/>
       </p:ext>
     </p:extLst>
   </p:cSld>
   <p:clrMap bg1="dk1" tx1="lt1" bg2="dk2" tx2="lt2" accent1="accent1" accent2="accent2" accent3="accent3" accent4="accent4" accent5="accent5" accent6="accent6" hlink="hlink" folHlink="folHlink"/>
   <p:sldLayoutIdLst>
-    <p:sldLayoutId id="2147483774" r:id="rId1"/>
-    <p:sldLayoutId id="2147483775" r:id="rId2"/>
-    <p:sldLayoutId id="2147483776" r:id="rId3"/>
-    <p:sldLayoutId id="2147483777" r:id="rId4"/>
-    <p:sldLayoutId id="2147483778" r:id="rId5"/>
-    <p:sldLayoutId id="2147483779" r:id="rId6"/>
-    <p:sldLayoutId id="2147483780" r:id="rId7"/>
-    <p:sldLayoutId id="2147483781" r:id="rId8"/>
-    <p:sldLayoutId id="2147483782" r:id="rId9"/>
-    <p:sldLayoutId id="2147483783" r:id="rId10"/>
-    <p:sldLayoutId id="2147483784" r:id="rId11"/>
-    <p:sldLayoutId id="2147483785" r:id="rId12"/>
-    <p:sldLayoutId id="2147483786" r:id="rId13"/>
-    <p:sldLayoutId id="2147483787" r:id="rId14"/>
-    <p:sldLayoutId id="2147483788" r:id="rId15"/>
-    <p:sldLayoutId id="2147483789" r:id="rId16"/>
+    <p:sldLayoutId id="2147483808" r:id="rId1"/>
+    <p:sldLayoutId id="2147483809" r:id="rId2"/>
+    <p:sldLayoutId id="2147483810" r:id="rId3"/>
+    <p:sldLayoutId id="2147483811" r:id="rId4"/>
+    <p:sldLayoutId id="2147483812" r:id="rId5"/>
+    <p:sldLayoutId id="2147483813" r:id="rId6"/>
+    <p:sldLayoutId id="2147483814" r:id="rId7"/>
+    <p:sldLayoutId id="2147483815" r:id="rId8"/>
+    <p:sldLayoutId id="2147483816" r:id="rId9"/>
+    <p:sldLayoutId id="2147483817" r:id="rId10"/>
+    <p:sldLayoutId id="2147483818" r:id="rId11"/>
+    <p:sldLayoutId id="2147483819" r:id="rId12"/>
+    <p:sldLayoutId id="2147483820" r:id="rId13"/>
+    <p:sldLayoutId id="2147483821" r:id="rId14"/>
+    <p:sldLayoutId id="2147483822" r:id="rId15"/>
+    <p:sldLayoutId id="2147483823" r:id="rId16"/>
   </p:sldLayoutIdLst>
   <p:txStyles>
     <p:titleStyle>
@@ -8292,66 +8520,6 @@
           <a:chExt cx="0" cy="0"/>
         </a:xfrm>
       </p:grpSpPr>
-      <p:sp useBgFill="1">
-        <p:nvSpPr>
-          <p:cNvPr id="67" name="Rectangle 7">
-            <a:extLst>
-              <a:ext uri="{FF2B5EF4-FFF2-40B4-BE49-F238E27FC236}">
-                <a16:creationId xmlns:a16="http://schemas.microsoft.com/office/drawing/2014/main" id="{57ABABA7-0420-4200-9B65-1C1967CE9373}"/>
-              </a:ext>
-              <a:ext uri="{C183D7F6-B498-43B3-948B-1728B52AA6E4}">
-                <adec:decorative xmlns:adec="http://schemas.microsoft.com/office/drawing/2017/decorative" val="1"/>
-              </a:ext>
-            </a:extLst>
-          </p:cNvPr>
-          <p:cNvSpPr>
-            <a:spLocks noGrp="1" noRot="1" noChangeAspect="1" noMove="1" noResize="1" noEditPoints="1" noAdjustHandles="1" noChangeArrowheads="1" noChangeShapeType="1" noTextEdit="1"/>
-          </p:cNvSpPr>
-          <p:nvPr>
-            <p:extLst>
-              <p:ext uri="{386F3935-93C4-4BCD-93E2-E3B085C9AB24}">
-                <p16:designElem xmlns:p16="http://schemas.microsoft.com/office/powerpoint/2015/main" val="1"/>
-              </p:ext>
-            </p:extLst>
-          </p:nvPr>
-        </p:nvSpPr>
-        <p:spPr>
-          <a:xfrm>
-            <a:off x="2" y="0"/>
-            <a:ext cx="12191998" cy="6858000"/>
-          </a:xfrm>
-          <a:prstGeom prst="rect">
-            <a:avLst/>
-          </a:prstGeom>
-          <a:ln>
-            <a:noFill/>
-          </a:ln>
-        </p:spPr>
-        <p:style>
-          <a:lnRef idx="2">
-            <a:schemeClr val="accent1">
-              <a:shade val="50000"/>
-            </a:schemeClr>
-          </a:lnRef>
-          <a:fillRef idx="1">
-            <a:schemeClr val="accent1"/>
-          </a:fillRef>
-          <a:effectRef idx="0">
-            <a:schemeClr val="accent1"/>
-          </a:effectRef>
-          <a:fontRef idx="minor">
-            <a:schemeClr val="lt1"/>
-          </a:fontRef>
-        </p:style>
-        <p:txBody>
-          <a:bodyPr rtlCol="0" anchor="ctr"/>
-          <a:lstStyle/>
-          <a:p>
-            <a:pPr algn="ctr"/>
-            <a:endParaRPr lang="en-US"/>
-          </a:p>
-        </p:txBody>
-      </p:sp>
       <p:sp>
         <p:nvSpPr>
           <p:cNvPr id="2" name="Title 1">
@@ -8393,7 +8561,7 @@
                   </a:schemeClr>
                 </a:solidFill>
               </a:rPr>
-              <a:t>Sentiment Analysis of Google Play App customer reviews</a:t>
+              <a:t>Sentiment Analysis of App reviews from Google Play Store</a:t>
             </a:r>
           </a:p>
         </p:txBody>
@@ -8460,112 +8628,6 @@
           </a:p>
         </p:txBody>
       </p:sp>
-      <p:sp>
-        <p:nvSpPr>
-          <p:cNvPr id="68" name="Rectangle 9">
-            <a:extLst>
-              <a:ext uri="{FF2B5EF4-FFF2-40B4-BE49-F238E27FC236}">
-                <a16:creationId xmlns:a16="http://schemas.microsoft.com/office/drawing/2014/main" id="{A317EBE3-FF86-4DA1-BC9A-331F7F2144E9}"/>
-              </a:ext>
-              <a:ext uri="{C183D7F6-B498-43B3-948B-1728B52AA6E4}">
-                <adec:decorative xmlns:adec="http://schemas.microsoft.com/office/drawing/2017/decorative" val="1"/>
-              </a:ext>
-            </a:extLst>
-          </p:cNvPr>
-          <p:cNvSpPr>
-            <a:spLocks noGrp="1" noRot="1" noChangeAspect="1" noMove="1" noResize="1" noEditPoints="1" noAdjustHandles="1" noChangeArrowheads="1" noChangeShapeType="1" noTextEdit="1"/>
-          </p:cNvSpPr>
-          <p:nvPr>
-            <p:extLst>
-              <p:ext uri="{386F3935-93C4-4BCD-93E2-E3B085C9AB24}">
-                <p16:designElem xmlns:p16="http://schemas.microsoft.com/office/powerpoint/2015/main" val="1"/>
-              </p:ext>
-            </p:extLst>
-          </p:nvPr>
-        </p:nvSpPr>
-        <p:spPr>
-          <a:xfrm>
-            <a:off x="0" y="0"/>
-            <a:ext cx="182880" cy="6858000"/>
-          </a:xfrm>
-          <a:prstGeom prst="rect">
-            <a:avLst/>
-          </a:prstGeom>
-          <a:solidFill>
-            <a:schemeClr val="tx2"/>
-          </a:solidFill>
-          <a:ln>
-            <a:noFill/>
-          </a:ln>
-          <a:effectLst/>
-        </p:spPr>
-        <p:style>
-          <a:lnRef idx="1">
-            <a:schemeClr val="accent1"/>
-          </a:lnRef>
-          <a:fillRef idx="3">
-            <a:schemeClr val="accent1"/>
-          </a:fillRef>
-          <a:effectRef idx="2">
-            <a:schemeClr val="accent1"/>
-          </a:effectRef>
-          <a:fontRef idx="minor">
-            <a:schemeClr val="lt1"/>
-          </a:fontRef>
-        </p:style>
-      </p:sp>
-      <p:cxnSp>
-        <p:nvCxnSpPr>
-          <p:cNvPr id="69" name="Straight Connector 11">
-            <a:extLst>
-              <a:ext uri="{FF2B5EF4-FFF2-40B4-BE49-F238E27FC236}">
-                <a16:creationId xmlns:a16="http://schemas.microsoft.com/office/drawing/2014/main" id="{34D43EC1-35FA-4FC3-8526-F655CEB09D9C}"/>
-              </a:ext>
-              <a:ext uri="{C183D7F6-B498-43B3-948B-1728B52AA6E4}">
-                <adec:decorative xmlns:adec="http://schemas.microsoft.com/office/drawing/2017/decorative" val="1"/>
-              </a:ext>
-            </a:extLst>
-          </p:cNvPr>
-          <p:cNvCxnSpPr>
-            <a:cxnSpLocks noGrp="1" noRot="1" noChangeAspect="1" noMove="1" noResize="1" noEditPoints="1" noAdjustHandles="1" noChangeArrowheads="1" noChangeShapeType="1"/>
-          </p:cNvCxnSpPr>
-          <p:nvPr>
-            <p:extLst>
-              <p:ext uri="{386F3935-93C4-4BCD-93E2-E3B085C9AB24}">
-                <p16:designElem xmlns:p16="http://schemas.microsoft.com/office/powerpoint/2015/main" val="1"/>
-              </p:ext>
-            </p:extLst>
-          </p:nvPr>
-        </p:nvCxnSpPr>
-        <p:spPr>
-          <a:xfrm>
-            <a:off x="7537196" y="1871831"/>
-            <a:ext cx="0" cy="3200400"/>
-          </a:xfrm>
-          <a:prstGeom prst="line">
-            <a:avLst/>
-          </a:prstGeom>
-          <a:ln w="15875">
-            <a:solidFill>
-              <a:schemeClr val="accent1"/>
-            </a:solidFill>
-          </a:ln>
-        </p:spPr>
-        <p:style>
-          <a:lnRef idx="1">
-            <a:schemeClr val="accent1"/>
-          </a:lnRef>
-          <a:fillRef idx="0">
-            <a:schemeClr val="accent1"/>
-          </a:fillRef>
-          <a:effectRef idx="0">
-            <a:schemeClr val="accent1"/>
-          </a:effectRef>
-          <a:fontRef idx="minor">
-            <a:schemeClr val="tx1"/>
-          </a:fontRef>
-        </p:style>
-      </p:cxnSp>
     </p:spTree>
     <p:extLst>
       <p:ext uri="{BB962C8B-B14F-4D97-AF65-F5344CB8AC3E}">
@@ -8804,7 +8866,7 @@
           <p:cNvPr id="2" name="Title 1">
             <a:extLst>
               <a:ext uri="{FF2B5EF4-FFF2-40B4-BE49-F238E27FC236}">
-                <a16:creationId xmlns:a16="http://schemas.microsoft.com/office/drawing/2014/main" id="{E690C563-19FD-42C3-AA57-A828CEC0A4FD}"/>
+                <a16:creationId xmlns:a16="http://schemas.microsoft.com/office/drawing/2014/main" id="{982DB59D-ADAF-4F3B-AE89-1A56F86A9BC3}"/>
               </a:ext>
             </a:extLst>
           </p:cNvPr>
@@ -8822,7 +8884,7 @@
           <a:p>
             <a:r>
               <a:rPr lang="en-US" dirty="0"/>
-              <a:t>Deliver</a:t>
+              <a:t>Design</a:t>
             </a:r>
             <a:endParaRPr lang="en-AU" dirty="0"/>
           </a:p>
@@ -8833,7 +8895,7 @@
           <p:cNvPr id="3" name="Content Placeholder 2">
             <a:extLst>
               <a:ext uri="{FF2B5EF4-FFF2-40B4-BE49-F238E27FC236}">
-                <a16:creationId xmlns:a16="http://schemas.microsoft.com/office/drawing/2014/main" id="{10963AB8-FE2D-48AC-A4CB-A964D25CACF4}"/>
+                <a16:creationId xmlns:a16="http://schemas.microsoft.com/office/drawing/2014/main" id="{19A2E474-769C-439C-90B3-4DA7770006E2}"/>
               </a:ext>
             </a:extLst>
           </p:cNvPr>
@@ -8844,60 +8906,80 @@
             <p:ph idx="1"/>
           </p:nvPr>
         </p:nvSpPr>
-        <p:spPr/>
+        <p:spPr>
+          <a:xfrm>
+            <a:off x="2589212" y="1535837"/>
+            <a:ext cx="8915400" cy="4375385"/>
+          </a:xfrm>
+        </p:spPr>
         <p:txBody>
           <a:bodyPr/>
           <a:lstStyle/>
           <a:p>
             <a:r>
               <a:rPr lang="en-US" dirty="0"/>
-              <a:t>Feature Engineering</a:t>
-            </a:r>
-          </a:p>
-          <a:p>
-            <a:pPr lvl="1"/>
-            <a:r>
-              <a:rPr lang="en-US" dirty="0"/>
-              <a:t>Count Vectorizers (bag-of-words), Word Level TFIDF, n-gram level TFIDF, Char level TFIDF</a:t>
-            </a:r>
-          </a:p>
-          <a:p>
-            <a:pPr lvl="1"/>
-            <a:r>
-              <a:rPr lang="en-US" dirty="0"/>
-              <a:t>For the purposes of sentiment analysis, Count Vectorizers will suffice since we are not interested in information retrieval. </a:t>
-            </a:r>
-          </a:p>
-          <a:p>
-            <a:r>
-              <a:rPr lang="en-US" dirty="0"/>
-              <a:t>Machine models used and evaluation metrics</a:t>
-            </a:r>
-          </a:p>
-          <a:p>
-            <a:pPr lvl="1"/>
-            <a:r>
-              <a:rPr lang="en-AU" dirty="0"/>
-              <a:t>Logistic Regression, SVM, SGD, Naïve Bayes, KNN, Decision Tree, Random Forest</a:t>
-            </a:r>
-          </a:p>
-          <a:p>
-            <a:pPr lvl="1"/>
-            <a:r>
-              <a:rPr lang="en-AU" dirty="0"/>
-              <a:t>Accuracy, ROC score</a:t>
-            </a:r>
-          </a:p>
-          <a:p>
-            <a:pPr lvl="1"/>
+              <a:t>Neutral Cloud</a:t>
+            </a:r>
+          </a:p>
+          <a:p>
+            <a:pPr marL="0" indent="0">
+              <a:buNone/>
+            </a:pPr>
             <a:endParaRPr lang="en-AU" dirty="0"/>
           </a:p>
         </p:txBody>
       </p:sp>
+      <p:pic>
+        <p:nvPicPr>
+          <p:cNvPr id="3074" name="Picture 2">
+            <a:extLst>
+              <a:ext uri="{FF2B5EF4-FFF2-40B4-BE49-F238E27FC236}">
+                <a16:creationId xmlns:a16="http://schemas.microsoft.com/office/drawing/2014/main" id="{5EAEB53C-D0D3-4F33-AE31-A8C90E4AEDA1}"/>
+              </a:ext>
+            </a:extLst>
+          </p:cNvPr>
+          <p:cNvPicPr>
+            <a:picLocks noChangeAspect="1" noChangeArrowheads="1"/>
+          </p:cNvPicPr>
+          <p:nvPr/>
+        </p:nvPicPr>
+        <p:blipFill>
+          <a:blip r:embed="rId2">
+            <a:extLst>
+              <a:ext uri="{28A0092B-C50C-407E-A947-70E740481C1C}">
+                <a14:useLocalDpi xmlns:a14="http://schemas.microsoft.com/office/drawing/2010/main" val="0"/>
+              </a:ext>
+            </a:extLst>
+          </a:blip>
+          <a:srcRect/>
+          <a:stretch>
+            <a:fillRect/>
+          </a:stretch>
+        </p:blipFill>
+        <p:spPr bwMode="auto">
+          <a:xfrm>
+            <a:off x="2276568" y="1957165"/>
+            <a:ext cx="8420100" cy="4276725"/>
+          </a:xfrm>
+          <a:prstGeom prst="rect">
+            <a:avLst/>
+          </a:prstGeom>
+          <a:noFill/>
+          <a:extLst>
+            <a:ext uri="{909E8E84-426E-40DD-AFC4-6F175D3DCCD1}">
+              <a14:hiddenFill xmlns:a14="http://schemas.microsoft.com/office/drawing/2010/main">
+                <a:solidFill>
+                  <a:srgbClr val="FFFFFF"/>
+                </a:solidFill>
+              </a14:hiddenFill>
+            </a:ext>
+          </a:extLst>
+        </p:spPr>
+      </p:pic>
     </p:spTree>
     <p:extLst>
       <p:ext uri="{BB962C8B-B14F-4D97-AF65-F5344CB8AC3E}">
-        <p14:creationId xmlns:p14="http://schemas.microsoft.com/office/powerpoint/2010/main" val="2126947556"/>
+        <p14:creationId xmlns:p14="http://schemas.microsoft.com/office/powerpoint/2010/main" val="2134914763"/>
       </p:ext>
     </p:extLst>
   </p:cSld>
@@ -8929,7 +9011,7 @@
           <p:cNvPr id="2" name="Title 1">
             <a:extLst>
               <a:ext uri="{FF2B5EF4-FFF2-40B4-BE49-F238E27FC236}">
-                <a16:creationId xmlns:a16="http://schemas.microsoft.com/office/drawing/2014/main" id="{6C818964-9215-41DD-A1F3-9C6EA8B40A29}"/>
+                <a16:creationId xmlns:a16="http://schemas.microsoft.com/office/drawing/2014/main" id="{BB77A1FA-0807-41B6-9968-8EF7C685A633}"/>
               </a:ext>
             </a:extLst>
           </p:cNvPr>
@@ -8947,7 +9029,7 @@
           <a:p>
             <a:r>
               <a:rPr lang="en-US" dirty="0"/>
-              <a:t>Deliver</a:t>
+              <a:t>Design</a:t>
             </a:r>
             <a:endParaRPr lang="en-AU" dirty="0"/>
           </a:p>
@@ -8958,7 +9040,7 @@
           <p:cNvPr id="3" name="Content Placeholder 2">
             <a:extLst>
               <a:ext uri="{FF2B5EF4-FFF2-40B4-BE49-F238E27FC236}">
-                <a16:creationId xmlns:a16="http://schemas.microsoft.com/office/drawing/2014/main" id="{5A9420FC-569D-4FF0-9AD5-1F26D58A6002}"/>
+                <a16:creationId xmlns:a16="http://schemas.microsoft.com/office/drawing/2014/main" id="{DCDA97B5-D74C-4DFB-9B5B-2C6D8C466AB9}"/>
               </a:ext>
             </a:extLst>
           </p:cNvPr>
@@ -8969,47 +9051,77 @@
             <p:ph idx="1"/>
           </p:nvPr>
         </p:nvSpPr>
-        <p:spPr/>
+        <p:spPr>
+          <a:xfrm>
+            <a:off x="2057367" y="1558122"/>
+            <a:ext cx="8915400" cy="4446406"/>
+          </a:xfrm>
+        </p:spPr>
         <p:txBody>
           <a:bodyPr/>
           <a:lstStyle/>
           <a:p>
             <a:r>
               <a:rPr lang="en-US" dirty="0"/>
-              <a:t>How does the model fir the overall solution?</a:t>
-            </a:r>
-          </a:p>
-          <a:p>
-            <a:pPr lvl="1"/>
-            <a:r>
-              <a:rPr lang="en-US" dirty="0"/>
-              <a:t>This will be used by the IT team at the start of a meeting or at the Planning phase of the SDLC.</a:t>
-            </a:r>
-          </a:p>
-          <a:p>
-            <a:pPr lvl="1"/>
-            <a:r>
-              <a:rPr lang="en-US" dirty="0"/>
-              <a:t>In terms of products, the business will understand how it is to prioritize its attention to products that are not doing well commercially</a:t>
-            </a:r>
-          </a:p>
-          <a:p>
-            <a:pPr lvl="1"/>
-            <a:r>
-              <a:rPr lang="en-US" dirty="0"/>
-              <a:t>In terms of features, the business can perform A/B feature testing faster as there is a faster mean time to recovery of errors (MTE)</a:t>
-            </a:r>
-          </a:p>
-          <a:p>
-            <a:pPr lvl="1"/>
+              <a:t>Positive Cloud</a:t>
+            </a:r>
+          </a:p>
+          <a:p>
             <a:endParaRPr lang="en-AU" dirty="0"/>
           </a:p>
         </p:txBody>
       </p:sp>
+      <p:pic>
+        <p:nvPicPr>
+          <p:cNvPr id="4101" name="Picture 5">
+            <a:extLst>
+              <a:ext uri="{FF2B5EF4-FFF2-40B4-BE49-F238E27FC236}">
+                <a16:creationId xmlns:a16="http://schemas.microsoft.com/office/drawing/2014/main" id="{D2268CD9-6DBE-4631-A171-EEB856966812}"/>
+              </a:ext>
+            </a:extLst>
+          </p:cNvPr>
+          <p:cNvPicPr>
+            <a:picLocks noChangeAspect="1" noChangeArrowheads="1"/>
+          </p:cNvPicPr>
+          <p:nvPr/>
+        </p:nvPicPr>
+        <p:blipFill>
+          <a:blip r:embed="rId2">
+            <a:extLst>
+              <a:ext uri="{28A0092B-C50C-407E-A947-70E740481C1C}">
+                <a14:useLocalDpi xmlns:a14="http://schemas.microsoft.com/office/drawing/2010/main" val="0"/>
+              </a:ext>
+            </a:extLst>
+          </a:blip>
+          <a:srcRect/>
+          <a:stretch>
+            <a:fillRect/>
+          </a:stretch>
+        </p:blipFill>
+        <p:spPr bwMode="auto">
+          <a:xfrm>
+            <a:off x="2057367" y="1957165"/>
+            <a:ext cx="8420100" cy="4276725"/>
+          </a:xfrm>
+          <a:prstGeom prst="rect">
+            <a:avLst/>
+          </a:prstGeom>
+          <a:noFill/>
+          <a:extLst>
+            <a:ext uri="{909E8E84-426E-40DD-AFC4-6F175D3DCCD1}">
+              <a14:hiddenFill xmlns:a14="http://schemas.microsoft.com/office/drawing/2010/main">
+                <a:solidFill>
+                  <a:srgbClr val="FFFFFF"/>
+                </a:solidFill>
+              </a14:hiddenFill>
+            </a:ext>
+          </a:extLst>
+        </p:spPr>
+      </p:pic>
     </p:spTree>
     <p:extLst>
       <p:ext uri="{BB962C8B-B14F-4D97-AF65-F5344CB8AC3E}">
-        <p14:creationId xmlns:p14="http://schemas.microsoft.com/office/powerpoint/2010/main" val="1656088696"/>
+        <p14:creationId xmlns:p14="http://schemas.microsoft.com/office/powerpoint/2010/main" val="3948413117"/>
       </p:ext>
     </p:extLst>
   </p:cSld>
@@ -9041,6 +9153,494 @@
           <p:cNvPr id="2" name="Title 1">
             <a:extLst>
               <a:ext uri="{FF2B5EF4-FFF2-40B4-BE49-F238E27FC236}">
+                <a16:creationId xmlns:a16="http://schemas.microsoft.com/office/drawing/2014/main" id="{E690C563-19FD-42C3-AA57-A828CEC0A4FD}"/>
+              </a:ext>
+            </a:extLst>
+          </p:cNvPr>
+          <p:cNvSpPr>
+            <a:spLocks noGrp="1"/>
+          </p:cNvSpPr>
+          <p:nvPr>
+            <p:ph type="title"/>
+          </p:nvPr>
+        </p:nvSpPr>
+        <p:spPr/>
+        <p:txBody>
+          <a:bodyPr/>
+          <a:lstStyle/>
+          <a:p>
+            <a:r>
+              <a:rPr lang="en-US" dirty="0"/>
+              <a:t>Deliver</a:t>
+            </a:r>
+            <a:endParaRPr lang="en-AU" dirty="0"/>
+          </a:p>
+        </p:txBody>
+      </p:sp>
+      <p:sp>
+        <p:nvSpPr>
+          <p:cNvPr id="3" name="Content Placeholder 2">
+            <a:extLst>
+              <a:ext uri="{FF2B5EF4-FFF2-40B4-BE49-F238E27FC236}">
+                <a16:creationId xmlns:a16="http://schemas.microsoft.com/office/drawing/2014/main" id="{10963AB8-FE2D-48AC-A4CB-A964D25CACF4}"/>
+              </a:ext>
+            </a:extLst>
+          </p:cNvPr>
+          <p:cNvSpPr>
+            <a:spLocks noGrp="1"/>
+          </p:cNvSpPr>
+          <p:nvPr>
+            <p:ph idx="1"/>
+          </p:nvPr>
+        </p:nvSpPr>
+        <p:spPr/>
+        <p:txBody>
+          <a:bodyPr/>
+          <a:lstStyle/>
+          <a:p>
+            <a:r>
+              <a:rPr lang="en-US" dirty="0"/>
+              <a:t>Feature Engineering</a:t>
+            </a:r>
+          </a:p>
+          <a:p>
+            <a:pPr lvl="1"/>
+            <a:r>
+              <a:rPr lang="en-US" dirty="0"/>
+              <a:t>Count Vectorizers (bag-of-words), Word Level TFIDF, n-gram level TFIDF, Char level TFIDF</a:t>
+            </a:r>
+          </a:p>
+          <a:p>
+            <a:pPr lvl="1"/>
+            <a:r>
+              <a:rPr lang="en-US" dirty="0"/>
+              <a:t>The comparisons on the table show the accuracies of a multiclass problem</a:t>
+            </a:r>
+          </a:p>
+          <a:p>
+            <a:pPr lvl="1"/>
+            <a:r>
+              <a:rPr lang="en-US" dirty="0"/>
+              <a:t>Accuracies are good to determine importance of features, and it seems that Count Vectorizer performed the </a:t>
+            </a:r>
+            <a:r>
+              <a:rPr lang="en-US"/>
+              <a:t>best overall</a:t>
+            </a:r>
+            <a:endParaRPr lang="en-US" dirty="0"/>
+          </a:p>
+          <a:p>
+            <a:r>
+              <a:rPr lang="en-US" dirty="0"/>
+              <a:t>Machine Learning models used and evaluation metrics</a:t>
+            </a:r>
+          </a:p>
+          <a:p>
+            <a:pPr lvl="1"/>
+            <a:r>
+              <a:rPr lang="en-AU" dirty="0"/>
+              <a:t>Logistic Regression, SVM, SGD, Naïve Bayes, KNN, Decision Tree, Random Forest</a:t>
+            </a:r>
+          </a:p>
+          <a:p>
+            <a:pPr lvl="1"/>
+            <a:r>
+              <a:rPr lang="en-AU" dirty="0"/>
+              <a:t>Accuracy, ROC score</a:t>
+            </a:r>
+          </a:p>
+          <a:p>
+            <a:pPr lvl="1"/>
+            <a:r>
+              <a:rPr lang="en-AU" dirty="0"/>
+              <a:t>The ROC curves show precision instead of accuracy, as focus is now on the performance on the model’s predictive value. </a:t>
+            </a:r>
+          </a:p>
+          <a:p>
+            <a:pPr lvl="1"/>
+            <a:endParaRPr lang="en-AU" dirty="0"/>
+          </a:p>
+        </p:txBody>
+      </p:sp>
+    </p:spTree>
+    <p:extLst>
+      <p:ext uri="{BB962C8B-B14F-4D97-AF65-F5344CB8AC3E}">
+        <p14:creationId xmlns:p14="http://schemas.microsoft.com/office/powerpoint/2010/main" val="2126947556"/>
+      </p:ext>
+    </p:extLst>
+  </p:cSld>
+  <p:clrMapOvr>
+    <a:masterClrMapping/>
+  </p:clrMapOvr>
+</p:sld>
+</file>
+
+<file path=ppt/slides/slide13.xml><?xml version="1.0" encoding="utf-8"?>
+<p:sld xmlns:a="http://schemas.openxmlformats.org/drawingml/2006/main" xmlns:r="http://schemas.openxmlformats.org/officeDocument/2006/relationships" xmlns:p="http://schemas.openxmlformats.org/presentationml/2006/main">
+  <p:cSld>
+    <p:spTree>
+      <p:nvGrpSpPr>
+        <p:cNvPr id="1" name=""/>
+        <p:cNvGrpSpPr/>
+        <p:nvPr/>
+      </p:nvGrpSpPr>
+      <p:grpSpPr>
+        <a:xfrm>
+          <a:off x="0" y="0"/>
+          <a:ext cx="0" cy="0"/>
+          <a:chOff x="0" y="0"/>
+          <a:chExt cx="0" cy="0"/>
+        </a:xfrm>
+      </p:grpSpPr>
+      <p:sp>
+        <p:nvSpPr>
+          <p:cNvPr id="2" name="Title 1">
+            <a:extLst>
+              <a:ext uri="{FF2B5EF4-FFF2-40B4-BE49-F238E27FC236}">
+                <a16:creationId xmlns:a16="http://schemas.microsoft.com/office/drawing/2014/main" id="{B47218B5-57A8-4C56-8840-68F4437A109D}"/>
+              </a:ext>
+            </a:extLst>
+          </p:cNvPr>
+          <p:cNvSpPr>
+            <a:spLocks noGrp="1"/>
+          </p:cNvSpPr>
+          <p:nvPr>
+            <p:ph type="title"/>
+          </p:nvPr>
+        </p:nvSpPr>
+        <p:spPr/>
+        <p:txBody>
+          <a:bodyPr/>
+          <a:lstStyle/>
+          <a:p>
+            <a:r>
+              <a:rPr lang="en-US" dirty="0"/>
+              <a:t>Features vs Models</a:t>
+            </a:r>
+            <a:endParaRPr lang="en-AU" dirty="0"/>
+          </a:p>
+        </p:txBody>
+      </p:sp>
+      <p:sp>
+        <p:nvSpPr>
+          <p:cNvPr id="3" name="Content Placeholder 2">
+            <a:extLst>
+              <a:ext uri="{FF2B5EF4-FFF2-40B4-BE49-F238E27FC236}">
+                <a16:creationId xmlns:a16="http://schemas.microsoft.com/office/drawing/2014/main" id="{E9A32212-27C7-4BE4-AB19-84DE9DDE852C}"/>
+              </a:ext>
+            </a:extLst>
+          </p:cNvPr>
+          <p:cNvSpPr>
+            <a:spLocks noGrp="1"/>
+          </p:cNvSpPr>
+          <p:nvPr>
+            <p:ph idx="1"/>
+          </p:nvPr>
+        </p:nvSpPr>
+        <p:spPr/>
+        <p:txBody>
+          <a:bodyPr/>
+          <a:lstStyle/>
+          <a:p>
+            <a:endParaRPr lang="en-AU"/>
+          </a:p>
+        </p:txBody>
+      </p:sp>
+      <p:pic>
+        <p:nvPicPr>
+          <p:cNvPr id="4" name="Picture 3">
+            <a:extLst>
+              <a:ext uri="{FF2B5EF4-FFF2-40B4-BE49-F238E27FC236}">
+                <a16:creationId xmlns:a16="http://schemas.microsoft.com/office/drawing/2014/main" id="{7D003A06-7944-4568-92C9-289704006293}"/>
+              </a:ext>
+            </a:extLst>
+          </p:cNvPr>
+          <p:cNvPicPr>
+            <a:picLocks noChangeAspect="1"/>
+          </p:cNvPicPr>
+          <p:nvPr/>
+        </p:nvPicPr>
+        <p:blipFill>
+          <a:blip r:embed="rId2"/>
+          <a:stretch>
+            <a:fillRect/>
+          </a:stretch>
+        </p:blipFill>
+        <p:spPr>
+          <a:xfrm>
+            <a:off x="1371935" y="1821341"/>
+            <a:ext cx="10493128" cy="4180189"/>
+          </a:xfrm>
+          <a:prstGeom prst="rect">
+            <a:avLst/>
+          </a:prstGeom>
+        </p:spPr>
+      </p:pic>
+    </p:spTree>
+    <p:extLst>
+      <p:ext uri="{BB962C8B-B14F-4D97-AF65-F5344CB8AC3E}">
+        <p14:creationId xmlns:p14="http://schemas.microsoft.com/office/powerpoint/2010/main" val="177021519"/>
+      </p:ext>
+    </p:extLst>
+  </p:cSld>
+  <p:clrMapOvr>
+    <a:masterClrMapping/>
+  </p:clrMapOvr>
+</p:sld>
+</file>
+
+<file path=ppt/slides/slide14.xml><?xml version="1.0" encoding="utf-8"?>
+<p:sld xmlns:a="http://schemas.openxmlformats.org/drawingml/2006/main" xmlns:r="http://schemas.openxmlformats.org/officeDocument/2006/relationships" xmlns:p="http://schemas.openxmlformats.org/presentationml/2006/main">
+  <p:cSld>
+    <p:bg>
+      <p:bgPr>
+        <a:solidFill>
+          <a:schemeClr val="bg2"/>
+        </a:solidFill>
+        <a:effectLst/>
+      </p:bgPr>
+    </p:bg>
+    <p:spTree>
+      <p:nvGrpSpPr>
+        <p:cNvPr id="1" name=""/>
+        <p:cNvGrpSpPr/>
+        <p:nvPr/>
+      </p:nvGrpSpPr>
+      <p:grpSpPr>
+        <a:xfrm>
+          <a:off x="0" y="0"/>
+          <a:ext cx="0" cy="0"/>
+          <a:chOff x="0" y="0"/>
+          <a:chExt cx="0" cy="0"/>
+        </a:xfrm>
+      </p:grpSpPr>
+      <p:sp>
+        <p:nvSpPr>
+          <p:cNvPr id="2" name="Title 1">
+            <a:extLst>
+              <a:ext uri="{FF2B5EF4-FFF2-40B4-BE49-F238E27FC236}">
+                <a16:creationId xmlns:a16="http://schemas.microsoft.com/office/drawing/2014/main" id="{077AE6DA-578F-4A3D-86B2-61F570813E01}"/>
+              </a:ext>
+            </a:extLst>
+          </p:cNvPr>
+          <p:cNvSpPr>
+            <a:spLocks noGrp="1"/>
+          </p:cNvSpPr>
+          <p:nvPr>
+            <p:ph type="title"/>
+          </p:nvPr>
+        </p:nvSpPr>
+        <p:spPr>
+          <a:xfrm>
+            <a:off x="2071717" y="624110"/>
+            <a:ext cx="3634139" cy="1280890"/>
+          </a:xfrm>
+        </p:spPr>
+        <p:txBody>
+          <a:bodyPr>
+            <a:normAutofit/>
+          </a:bodyPr>
+          <a:lstStyle/>
+          <a:p>
+            <a:r>
+              <a:rPr lang="en-US" dirty="0"/>
+              <a:t>ROC curve comparisons</a:t>
+            </a:r>
+            <a:endParaRPr lang="en-AU" dirty="0"/>
+          </a:p>
+        </p:txBody>
+      </p:sp>
+      <p:sp>
+        <p:nvSpPr>
+          <p:cNvPr id="3" name="Content Placeholder 2">
+            <a:extLst>
+              <a:ext uri="{FF2B5EF4-FFF2-40B4-BE49-F238E27FC236}">
+                <a16:creationId xmlns:a16="http://schemas.microsoft.com/office/drawing/2014/main" id="{4F1570F0-CBC9-42BE-9B93-6888DBBF7EB9}"/>
+              </a:ext>
+            </a:extLst>
+          </p:cNvPr>
+          <p:cNvSpPr>
+            <a:spLocks noGrp="1"/>
+          </p:cNvSpPr>
+          <p:nvPr>
+            <p:ph idx="1"/>
+          </p:nvPr>
+        </p:nvSpPr>
+        <p:spPr>
+          <a:xfrm>
+            <a:off x="2068004" y="2133600"/>
+            <a:ext cx="3637852" cy="3777622"/>
+          </a:xfrm>
+        </p:spPr>
+        <p:txBody>
+          <a:bodyPr>
+            <a:normAutofit fontScale="92500" lnSpcReduction="20000"/>
+          </a:bodyPr>
+          <a:lstStyle/>
+          <a:p>
+            <a:r>
+              <a:rPr lang="en-US" dirty="0"/>
+              <a:t>Logistic Regression, SVM and Random Forest all seem to have the same precision scores</a:t>
+            </a:r>
+          </a:p>
+          <a:p>
+            <a:r>
+              <a:rPr lang="en-US" dirty="0"/>
+              <a:t>Training time (G for </a:t>
+            </a:r>
+            <a:r>
+              <a:rPr lang="en-US" dirty="0" err="1"/>
+              <a:t>GridSearch</a:t>
+            </a:r>
+            <a:r>
+              <a:rPr lang="en-US" dirty="0"/>
+              <a:t> fit):</a:t>
+            </a:r>
+          </a:p>
+          <a:p>
+            <a:pPr lvl="1"/>
+            <a:r>
+              <a:rPr lang="en-US" dirty="0"/>
+              <a:t>Log regression: 49.8s (G)</a:t>
+            </a:r>
+          </a:p>
+          <a:p>
+            <a:pPr lvl="1"/>
+            <a:r>
+              <a:rPr lang="en-US" dirty="0"/>
+              <a:t>SVC: 28.5s (G)</a:t>
+            </a:r>
+          </a:p>
+          <a:p>
+            <a:pPr lvl="1"/>
+            <a:r>
+              <a:rPr lang="en-US" dirty="0"/>
+              <a:t>SGD: 29.5s (G)</a:t>
+            </a:r>
+          </a:p>
+          <a:p>
+            <a:pPr lvl="1"/>
+            <a:r>
+              <a:rPr lang="en-US" dirty="0"/>
+              <a:t>NB: 459 </a:t>
+            </a:r>
+            <a:r>
+              <a:rPr lang="en-US" dirty="0" err="1"/>
+              <a:t>ms</a:t>
+            </a:r>
+            <a:r>
+              <a:rPr lang="en-US" dirty="0"/>
+              <a:t> (G)</a:t>
+            </a:r>
+          </a:p>
+          <a:p>
+            <a:pPr lvl="1"/>
+            <a:r>
+              <a:rPr lang="en-US" dirty="0"/>
+              <a:t>KNN: 8 min 6s (G)</a:t>
+            </a:r>
+          </a:p>
+          <a:p>
+            <a:pPr lvl="1"/>
+            <a:r>
+              <a:rPr lang="en-US" dirty="0"/>
+              <a:t>Decision Tree: 12min 35 s</a:t>
+            </a:r>
+          </a:p>
+          <a:p>
+            <a:pPr lvl="1"/>
+            <a:r>
+              <a:rPr lang="en-US"/>
+              <a:t>Random Forest: 1min 13s</a:t>
+            </a:r>
+            <a:endParaRPr lang="en-US" dirty="0"/>
+          </a:p>
+          <a:p>
+            <a:pPr lvl="1"/>
+            <a:endParaRPr lang="en-US" dirty="0"/>
+          </a:p>
+          <a:p>
+            <a:pPr lvl="1"/>
+            <a:endParaRPr lang="en-US" dirty="0"/>
+          </a:p>
+        </p:txBody>
+      </p:sp>
+      <p:pic>
+        <p:nvPicPr>
+          <p:cNvPr id="1026" name="Picture 2">
+            <a:extLst>
+              <a:ext uri="{FF2B5EF4-FFF2-40B4-BE49-F238E27FC236}">
+                <a16:creationId xmlns:a16="http://schemas.microsoft.com/office/drawing/2014/main" id="{9358CADE-E6A4-48FD-B70D-B6371D188580}"/>
+              </a:ext>
+            </a:extLst>
+          </p:cNvPr>
+          <p:cNvPicPr>
+            <a:picLocks noChangeAspect="1" noChangeArrowheads="1"/>
+          </p:cNvPicPr>
+          <p:nvPr/>
+        </p:nvPicPr>
+        <p:blipFill>
+          <a:blip r:embed="rId2">
+            <a:extLst>
+              <a:ext uri="{28A0092B-C50C-407E-A947-70E740481C1C}">
+                <a14:useLocalDpi xmlns:a14="http://schemas.microsoft.com/office/drawing/2010/main" val="0"/>
+              </a:ext>
+            </a:extLst>
+          </a:blip>
+          <a:stretch>
+            <a:fillRect/>
+          </a:stretch>
+        </p:blipFill>
+        <p:spPr bwMode="auto">
+          <a:xfrm>
+            <a:off x="6272572" y="645106"/>
+            <a:ext cx="5090314" cy="5247747"/>
+          </a:xfrm>
+          <a:prstGeom prst="rect">
+            <a:avLst/>
+          </a:prstGeom>
+          <a:solidFill>
+            <a:schemeClr val="tx1">
+              <a:lumMod val="95000"/>
+            </a:schemeClr>
+          </a:solidFill>
+        </p:spPr>
+      </p:pic>
+    </p:spTree>
+    <p:extLst>
+      <p:ext uri="{BB962C8B-B14F-4D97-AF65-F5344CB8AC3E}">
+        <p14:creationId xmlns:p14="http://schemas.microsoft.com/office/powerpoint/2010/main" val="1926305711"/>
+      </p:ext>
+    </p:extLst>
+  </p:cSld>
+  <p:clrMapOvr>
+    <a:masterClrMapping/>
+  </p:clrMapOvr>
+</p:sld>
+</file>
+
+<file path=ppt/slides/slide15.xml><?xml version="1.0" encoding="utf-8"?>
+<p:sld xmlns:a="http://schemas.openxmlformats.org/drawingml/2006/main" xmlns:r="http://schemas.openxmlformats.org/officeDocument/2006/relationships" xmlns:p="http://schemas.openxmlformats.org/presentationml/2006/main">
+  <p:cSld>
+    <p:spTree>
+      <p:nvGrpSpPr>
+        <p:cNvPr id="1" name=""/>
+        <p:cNvGrpSpPr/>
+        <p:nvPr/>
+      </p:nvGrpSpPr>
+      <p:grpSpPr>
+        <a:xfrm>
+          <a:off x="0" y="0"/>
+          <a:ext cx="0" cy="0"/>
+          <a:chOff x="0" y="0"/>
+          <a:chExt cx="0" cy="0"/>
+        </a:xfrm>
+      </p:grpSpPr>
+      <p:sp>
+        <p:nvSpPr>
+          <p:cNvPr id="2" name="Title 1">
+            <a:extLst>
+              <a:ext uri="{FF2B5EF4-FFF2-40B4-BE49-F238E27FC236}">
                 <a16:creationId xmlns:a16="http://schemas.microsoft.com/office/drawing/2014/main" id="{DC24AD11-DE99-43A7-B16F-C6E82565A320}"/>
               </a:ext>
             </a:extLst>
@@ -9156,7 +9756,7 @@
 </p:sld>
 </file>
 
-<file path=ppt/slides/slide13.xml><?xml version="1.0" encoding="utf-8"?>
+<file path=ppt/slides/slide16.xml><?xml version="1.0" encoding="utf-8"?>
 <p:sld xmlns:a="http://schemas.openxmlformats.org/drawingml/2006/main" xmlns:r="http://schemas.openxmlformats.org/officeDocument/2006/relationships" xmlns:p="http://schemas.openxmlformats.org/presentationml/2006/main">
   <p:cSld>
     <p:spTree>
@@ -9625,9 +10225,16 @@
             <p:ph idx="1"/>
           </p:nvPr>
         </p:nvSpPr>
-        <p:spPr/>
-        <p:txBody>
-          <a:bodyPr/>
+        <p:spPr>
+          <a:xfrm>
+            <a:off x="2148396" y="1518082"/>
+            <a:ext cx="9356216" cy="4715808"/>
+          </a:xfrm>
+        </p:spPr>
+        <p:txBody>
+          <a:bodyPr>
+            <a:normAutofit/>
+          </a:bodyPr>
           <a:lstStyle/>
           <a:p>
             <a:pPr lvl="1"/>
@@ -9640,7 +10247,7 @@
             <a:pPr lvl="2"/>
             <a:r>
               <a:rPr lang="en-AU" dirty="0"/>
-              <a:t>Masters of Information Technology Graduate 2019, Major: Data Analytics</a:t>
+              <a:t>Masters of Information Technology</a:t>
             </a:r>
           </a:p>
           <a:p>
@@ -9654,7 +10261,21 @@
             <a:pPr lvl="2"/>
             <a:r>
               <a:rPr lang="en-AU" dirty="0"/>
-              <a:t>Experience in data engineering at a start-up called Possible doing NLP</a:t>
+              <a:t>Experience in data engineering at a start-up called Possible Me</a:t>
+            </a:r>
+          </a:p>
+          <a:p>
+            <a:pPr lvl="3"/>
+            <a:r>
+              <a:rPr lang="en-AU" dirty="0"/>
+              <a:t>NLP</a:t>
+            </a:r>
+          </a:p>
+          <a:p>
+            <a:pPr lvl="3"/>
+            <a:r>
+              <a:rPr lang="en-AU" dirty="0"/>
+              <a:t>Google Cloud Platform (GCP)</a:t>
             </a:r>
           </a:p>
           <a:p>
@@ -9668,14 +10289,35 @@
             <a:pPr lvl="3"/>
             <a:r>
               <a:rPr lang="en-AU" dirty="0"/>
-              <a:t>25+ features engineered, 5+ models used</a:t>
+              <a:t>25+ features engineered</a:t>
             </a:r>
           </a:p>
           <a:p>
             <a:pPr lvl="2"/>
             <a:r>
               <a:rPr lang="en-AU" dirty="0"/>
-              <a:t>Sentiment Analysis Mini Project catalyst for Capstone Project</a:t>
+              <a:t>IOD</a:t>
+            </a:r>
+          </a:p>
+          <a:p>
+            <a:pPr lvl="3"/>
+            <a:r>
+              <a:rPr lang="en-AU" dirty="0"/>
+              <a:t>Heroku</a:t>
+            </a:r>
+          </a:p>
+          <a:p>
+            <a:pPr lvl="3"/>
+            <a:r>
+              <a:rPr lang="en-AU" dirty="0"/>
+              <a:t>Feature Engineering</a:t>
+            </a:r>
+          </a:p>
+          <a:p>
+            <a:pPr lvl="3"/>
+            <a:r>
+              <a:rPr lang="en-AU" dirty="0"/>
+              <a:t>Mathematics and Statistical Methods</a:t>
             </a:r>
           </a:p>
           <a:p>
@@ -9757,10 +10399,15 @@
             <p:ph idx="1"/>
           </p:nvPr>
         </p:nvSpPr>
-        <p:spPr/>
+        <p:spPr>
+          <a:xfrm>
+            <a:off x="2589212" y="1713390"/>
+            <a:ext cx="8915400" cy="4197832"/>
+          </a:xfrm>
+        </p:spPr>
         <p:txBody>
           <a:bodyPr>
-            <a:normAutofit lnSpcReduction="10000"/>
+            <a:normAutofit/>
           </a:bodyPr>
           <a:lstStyle/>
           <a:p>
@@ -9785,15 +10432,57 @@
           <a:p>
             <a:pPr lvl="1"/>
             <a:r>
-              <a:rPr lang="en-AU" dirty="0"/>
-              <a:t>Young start-up Possible Me operates in a competitive landscape that adopts an Agile, customer-focussed approach. Even so, customer complaints are not being read because of its large volume and variety</a:t>
+              <a:rPr lang="en-US" dirty="0"/>
+              <a:t>Possible  Me has problems with product prioritization and feature prioritization</a:t>
             </a:r>
           </a:p>
           <a:p>
             <a:pPr lvl="1"/>
             <a:r>
-              <a:rPr lang="en-US" sz="2400" dirty="0"/>
-              <a:t>However, their A/B Testing time takes an average of 3 days. Using NLP and sentiment analysis, they want to be able to quickly forecast the current sentiment concerning the product portfolio to speed up iterations</a:t>
+              <a:rPr lang="en-US" dirty="0"/>
+              <a:t>Problems</a:t>
+            </a:r>
+          </a:p>
+          <a:p>
+            <a:pPr lvl="2"/>
+            <a:r>
+              <a:rPr lang="en-US" dirty="0"/>
+              <a:t>Agile problems</a:t>
+            </a:r>
+          </a:p>
+          <a:p>
+            <a:pPr lvl="2"/>
+            <a:r>
+              <a:rPr lang="en-US" dirty="0"/>
+              <a:t>Product Owner ignores scope creep</a:t>
+            </a:r>
+          </a:p>
+          <a:p>
+            <a:pPr lvl="2"/>
+            <a:r>
+              <a:rPr lang="en-US" dirty="0"/>
+              <a:t>Manager is pressured with budget deadlines</a:t>
+            </a:r>
+          </a:p>
+          <a:p>
+            <a:pPr lvl="2"/>
+            <a:r>
+              <a:rPr lang="en-US" dirty="0"/>
+              <a:t>Requirements Analysts and Software developers are constantly awaiting approval</a:t>
+            </a:r>
+          </a:p>
+          <a:p>
+            <a:pPr lvl="1"/>
+            <a:r>
+              <a:rPr lang="en-US" dirty="0"/>
+              <a:t>Value proposition</a:t>
+            </a:r>
+          </a:p>
+          <a:p>
+            <a:pPr lvl="2"/>
+            <a:r>
+              <a:rPr lang="en-US" dirty="0"/>
+              <a:t>Need dashboard/ metric to measure real time customer sentiment to prioritize product and features</a:t>
             </a:r>
             <a:endParaRPr lang="en-AU" dirty="0"/>
           </a:p>
@@ -9851,9 +10540,10 @@
           <a:lstStyle/>
           <a:p>
             <a:r>
-              <a:rPr lang="en-AU" dirty="0"/>
+              <a:rPr lang="en-AU"/>
               <a:t>Define</a:t>
             </a:r>
+            <a:endParaRPr lang="en-AU" dirty="0"/>
           </a:p>
         </p:txBody>
       </p:sp>
@@ -9876,7 +10566,7 @@
         <p:spPr/>
         <p:txBody>
           <a:bodyPr>
-            <a:normAutofit fontScale="92500" lnSpcReduction="10000"/>
+            <a:normAutofit/>
           </a:bodyPr>
           <a:lstStyle/>
           <a:p>
@@ -9903,7 +10593,11 @@
             </a:r>
             <a:r>
               <a:rPr lang="en-GB" dirty="0"/>
-              <a:t>How to increase delivery cycle speeds by prioritizing applications with the lowest perceived value from customers?</a:t>
+              <a:t>How to increase delivery cycle speeds and boost revenue by prioritizing </a:t>
+            </a:r>
+            <a:r>
+              <a:rPr lang="en-US" dirty="0"/>
+              <a:t>product and features?</a:t>
             </a:r>
             <a:endParaRPr lang="en-AU" dirty="0"/>
           </a:p>
@@ -9917,14 +10611,7 @@
           <a:p>
             <a:pPr marL="1485900" lvl="2" indent="-342900"/>
             <a:r>
-              <a:rPr lang="en-US" sz="2000" dirty="0"/>
-              <a:t>Reduce change fail percentage for cycle times</a:t>
-            </a:r>
-          </a:p>
-          <a:p>
-            <a:pPr marL="1485900" lvl="2" indent="-342900"/>
-            <a:r>
-              <a:rPr lang="en-US" sz="2000" dirty="0"/>
+              <a:rPr lang="en-US" dirty="0"/>
               <a:t>Reduce mean time to restoration for cycle times</a:t>
             </a:r>
           </a:p>
@@ -9939,14 +10626,14 @@
             <a:pPr marL="1485900" lvl="2" indent="-342900"/>
             <a:r>
               <a:rPr lang="en-US" dirty="0"/>
-              <a:t>To increase production cycle times</a:t>
+              <a:t>To help the product owner and manager manage scope creep</a:t>
             </a:r>
           </a:p>
           <a:p>
             <a:pPr marL="1485900" lvl="2" indent="-342900"/>
             <a:r>
               <a:rPr lang="en-US" dirty="0"/>
-              <a:t>To increase quarterly operational gross profit</a:t>
+              <a:t>To increase gross profit</a:t>
             </a:r>
           </a:p>
           <a:p>
@@ -10036,7 +10723,7 @@
         <p:spPr/>
         <p:txBody>
           <a:bodyPr>
-            <a:normAutofit fontScale="92500" lnSpcReduction="20000"/>
+            <a:normAutofit/>
           </a:bodyPr>
           <a:lstStyle/>
           <a:p>
@@ -10048,56 +10735,29 @@
           <a:p>
             <a:pPr lvl="1"/>
             <a:r>
+              <a:rPr lang="en-GB" dirty="0"/>
+              <a:t>Accuracy, Precision and ROC Score</a:t>
+            </a:r>
+          </a:p>
+          <a:p>
+            <a:pPr lvl="1"/>
+            <a:r>
+              <a:rPr lang="en-GB" dirty="0"/>
+              <a:t>Classification Problem: Multiclass and Binary</a:t>
+            </a:r>
+          </a:p>
+          <a:p>
+            <a:pPr lvl="2"/>
+            <a:r>
               <a:rPr lang="en-AU" dirty="0"/>
-              <a:t>Data question</a:t>
+              <a:t>Dependent Variable (X), Customer reviews: text string type</a:t>
             </a:r>
           </a:p>
           <a:p>
             <a:pPr lvl="2"/>
             <a:r>
-              <a:rPr lang="en-GB" sz="1800" dirty="0">
-                <a:effectLst/>
-                <a:latin typeface="Arial" panose="020B0604020202020204" pitchFamily="34" charset="0"/>
-                <a:ea typeface="Arial" panose="020B0604020202020204" pitchFamily="34" charset="0"/>
-              </a:rPr>
-              <a:t>Question: What are the models and features give us the best accuracy and ROC scores when predicting sentiment of customer reviews on the Google Play Store?</a:t>
-            </a:r>
-          </a:p>
-          <a:p>
-            <a:pPr lvl="1"/>
-            <a:r>
-              <a:rPr lang="en-GB" dirty="0"/>
-              <a:t>Data required</a:t>
-            </a:r>
-          </a:p>
-          <a:p>
-            <a:pPr lvl="2"/>
-            <a:r>
-              <a:rPr lang="en-GB" sz="1800" dirty="0">
-                <a:effectLst/>
-                <a:latin typeface="Arial" panose="020B0604020202020204" pitchFamily="34" charset="0"/>
-                <a:ea typeface="Arial" panose="020B0604020202020204" pitchFamily="34" charset="0"/>
-              </a:rPr>
-              <a:t>To answer the question, we need to frame the problem as a supervised machine learning problem that requires labelled training and test data.</a:t>
-            </a:r>
-            <a:endParaRPr lang="en-AU" sz="1800" dirty="0">
-              <a:effectLst/>
-              <a:latin typeface="Arial" panose="020B0604020202020204" pitchFamily="34" charset="0"/>
-              <a:ea typeface="Arial" panose="020B0604020202020204" pitchFamily="34" charset="0"/>
-            </a:endParaRPr>
-          </a:p>
-          <a:p>
-            <a:pPr lvl="2"/>
-            <a:r>
               <a:rPr lang="en-AU" dirty="0"/>
-              <a:t>Customer reviews: text string type</a:t>
-            </a:r>
-          </a:p>
-          <a:p>
-            <a:pPr lvl="2"/>
-            <a:r>
-              <a:rPr lang="en-AU" dirty="0"/>
-              <a:t>Sentiment label: binary or polarized integer type</a:t>
+              <a:t>Independent Variable (Y), Sentiment label: binary</a:t>
             </a:r>
           </a:p>
           <a:p>
@@ -10130,26 +10790,29 @@
           <a:p>
             <a:pPr lvl="2"/>
             <a:r>
-              <a:rPr lang="en-GB" sz="1800" dirty="0">
-                <a:effectLst/>
-                <a:latin typeface="Arial" panose="020B0604020202020204" pitchFamily="34" charset="0"/>
-                <a:ea typeface="Arial" panose="020B0604020202020204" pitchFamily="34" charset="0"/>
-              </a:rPr>
-              <a:t>Google Play: </a:t>
-            </a:r>
-            <a:r>
-              <a:rPr lang="en-GB" sz="1800" u="sng" dirty="0">
-                <a:solidFill>
-                  <a:srgbClr val="0000FF"/>
-                </a:solidFill>
-                <a:effectLst/>
-                <a:latin typeface="Arial" panose="020B0604020202020204" pitchFamily="34" charset="0"/>
-                <a:ea typeface="Arial" panose="020B0604020202020204" pitchFamily="34" charset="0"/>
-                <a:hlinkClick r:id="rId3"/>
+              <a:rPr lang="en-GB" dirty="0"/>
+              <a:t>Google Play Scrapping: </a:t>
+            </a:r>
+            <a:r>
+              <a:rPr lang="en-GB" dirty="0">
+                <a:hlinkClick r:id="rId3">
+                  <a:extLst>
+                    <a:ext uri="{A12FA001-AC4F-418D-AE19-62706E023703}">
+                      <ahyp:hlinkClr xmlns:ahyp="http://schemas.microsoft.com/office/drawing/2018/hyperlinkcolor" val="tx"/>
+                    </a:ext>
+                  </a:extLst>
+                </a:hlinkClick>
               </a:rPr>
               <a:t>https://play.google.com/store</a:t>
             </a:r>
-            <a:endParaRPr lang="en-AU" dirty="0"/>
+            <a:endParaRPr lang="en-GB" dirty="0"/>
+          </a:p>
+          <a:p>
+            <a:pPr lvl="2"/>
+            <a:r>
+              <a:rPr lang="en-AU" dirty="0"/>
+              <a:t>Python API: https://pypi.org/project/google-play-scraper/</a:t>
+            </a:r>
           </a:p>
           <a:p>
             <a:pPr marL="457200" lvl="1" indent="0">
@@ -10194,7 +10857,7 @@
           <p:cNvPr id="2" name="Title 1">
             <a:extLst>
               <a:ext uri="{FF2B5EF4-FFF2-40B4-BE49-F238E27FC236}">
-                <a16:creationId xmlns:a16="http://schemas.microsoft.com/office/drawing/2014/main" id="{7164A467-CE29-4753-951E-FA56A5B8866E}"/>
+                <a16:creationId xmlns:a16="http://schemas.microsoft.com/office/drawing/2014/main" id="{CA7AC13D-638F-43E0-A0AC-1B2BC52956AB}"/>
               </a:ext>
             </a:extLst>
           </p:cNvPr>
@@ -10212,7 +10875,7 @@
           <a:p>
             <a:r>
               <a:rPr lang="en-US" dirty="0"/>
-              <a:t>Define</a:t>
+              <a:t>Kaggle dataset</a:t>
             </a:r>
             <a:endParaRPr lang="en-AU" dirty="0"/>
           </a:p>
@@ -10223,7 +10886,7 @@
           <p:cNvPr id="3" name="Content Placeholder 2">
             <a:extLst>
               <a:ext uri="{FF2B5EF4-FFF2-40B4-BE49-F238E27FC236}">
-                <a16:creationId xmlns:a16="http://schemas.microsoft.com/office/drawing/2014/main" id="{E51F004A-2C7F-4E04-BA2C-6B46B2598D5A}"/>
+                <a16:creationId xmlns:a16="http://schemas.microsoft.com/office/drawing/2014/main" id="{B164A26F-B2DE-4329-B4FB-3ECADB0747DD}"/>
               </a:ext>
             </a:extLst>
           </p:cNvPr>
@@ -10236,79 +10899,47 @@
         </p:nvSpPr>
         <p:spPr/>
         <p:txBody>
-          <a:bodyPr>
-            <a:normAutofit/>
-          </a:bodyPr>
+          <a:bodyPr/>
           <a:lstStyle/>
           <a:p>
-            <a:r>
-              <a:rPr lang="en-US" dirty="0"/>
-              <a:t>Data Sourced (cont.)</a:t>
-            </a:r>
-          </a:p>
-          <a:p>
-            <a:pPr lvl="1"/>
-            <a:r>
-              <a:rPr lang="en-GB" dirty="0"/>
-              <a:t>Volume</a:t>
-            </a:r>
-          </a:p>
-          <a:p>
-            <a:pPr lvl="2"/>
-            <a:r>
-              <a:rPr lang="en-GB" dirty="0"/>
-              <a:t>The data is very dense but not sparse. It only has 5 features, 2 of which are completely useless for this exercise.</a:t>
-            </a:r>
-            <a:endParaRPr lang="en-AU" sz="2800" dirty="0"/>
-          </a:p>
-          <a:p>
-            <a:pPr lvl="1"/>
-            <a:r>
-              <a:rPr lang="en-GB" dirty="0"/>
-              <a:t>Variety</a:t>
-            </a:r>
-          </a:p>
-          <a:p>
-            <a:pPr lvl="2"/>
-            <a:r>
-              <a:rPr lang="en-GB" dirty="0"/>
-              <a:t>The dataset contains 1074 Google Play Mobile Apps with Reviews ranging from 30 -320 per app. There is relative diversity in the groupings of Apps as they are arranged alphabetically without bias toward a particular market or genre</a:t>
-            </a:r>
-            <a:r>
-              <a:rPr lang="en-GB" sz="2400" dirty="0"/>
-              <a:t>.</a:t>
-            </a:r>
-          </a:p>
-          <a:p>
-            <a:pPr lvl="2"/>
-            <a:r>
-              <a:rPr lang="en-GB" sz="1800" dirty="0">
-                <a:effectLst/>
-                <a:latin typeface="Arial" panose="020B0604020202020204" pitchFamily="34" charset="0"/>
-                <a:ea typeface="Arial" panose="020B0604020202020204" pitchFamily="34" charset="0"/>
-              </a:rPr>
-              <a:t>The sentiment labels have 3 categories, negative, neutral, and positive labelled in a set {-1, 0, 1}.</a:t>
-            </a:r>
-            <a:endParaRPr lang="en-AU" sz="2400" dirty="0"/>
-          </a:p>
-          <a:p>
-            <a:pPr lvl="1"/>
-            <a:endParaRPr lang="en-US" dirty="0"/>
-          </a:p>
-          <a:p>
-            <a:pPr lvl="1"/>
-            <a:endParaRPr lang="en-US" dirty="0"/>
-          </a:p>
-          <a:p>
-            <a:pPr lvl="1"/>
             <a:endParaRPr lang="en-AU" dirty="0"/>
           </a:p>
         </p:txBody>
       </p:sp>
+      <p:pic>
+        <p:nvPicPr>
+          <p:cNvPr id="5" name="Picture 4">
+            <a:extLst>
+              <a:ext uri="{FF2B5EF4-FFF2-40B4-BE49-F238E27FC236}">
+                <a16:creationId xmlns:a16="http://schemas.microsoft.com/office/drawing/2014/main" id="{F879CB6C-6CFD-4AAE-8390-ACD70E77F386}"/>
+              </a:ext>
+            </a:extLst>
+          </p:cNvPr>
+          <p:cNvPicPr>
+            <a:picLocks noChangeAspect="1"/>
+          </p:cNvPicPr>
+          <p:nvPr/>
+        </p:nvPicPr>
+        <p:blipFill>
+          <a:blip r:embed="rId2"/>
+          <a:stretch>
+            <a:fillRect/>
+          </a:stretch>
+        </p:blipFill>
+        <p:spPr>
+          <a:xfrm>
+            <a:off x="2589212" y="1527790"/>
+            <a:ext cx="8439150" cy="4810125"/>
+          </a:xfrm>
+          <a:prstGeom prst="rect">
+            <a:avLst/>
+          </a:prstGeom>
+        </p:spPr>
+      </p:pic>
     </p:spTree>
     <p:extLst>
       <p:ext uri="{BB962C8B-B14F-4D97-AF65-F5344CB8AC3E}">
-        <p14:creationId xmlns:p14="http://schemas.microsoft.com/office/powerpoint/2010/main" val="2505818061"/>
+        <p14:creationId xmlns:p14="http://schemas.microsoft.com/office/powerpoint/2010/main" val="811470364"/>
       </p:ext>
     </p:extLst>
   </p:cSld>
@@ -10340,6 +10971,151 @@
           <p:cNvPr id="2" name="Title 1">
             <a:extLst>
               <a:ext uri="{FF2B5EF4-FFF2-40B4-BE49-F238E27FC236}">
+                <a16:creationId xmlns:a16="http://schemas.microsoft.com/office/drawing/2014/main" id="{7164A467-CE29-4753-951E-FA56A5B8866E}"/>
+              </a:ext>
+            </a:extLst>
+          </p:cNvPr>
+          <p:cNvSpPr>
+            <a:spLocks noGrp="1"/>
+          </p:cNvSpPr>
+          <p:nvPr>
+            <p:ph type="title"/>
+          </p:nvPr>
+        </p:nvSpPr>
+        <p:spPr/>
+        <p:txBody>
+          <a:bodyPr/>
+          <a:lstStyle/>
+          <a:p>
+            <a:r>
+              <a:rPr lang="en-US" dirty="0"/>
+              <a:t>Define</a:t>
+            </a:r>
+            <a:endParaRPr lang="en-AU" dirty="0"/>
+          </a:p>
+        </p:txBody>
+      </p:sp>
+      <p:sp>
+        <p:nvSpPr>
+          <p:cNvPr id="3" name="Content Placeholder 2">
+            <a:extLst>
+              <a:ext uri="{FF2B5EF4-FFF2-40B4-BE49-F238E27FC236}">
+                <a16:creationId xmlns:a16="http://schemas.microsoft.com/office/drawing/2014/main" id="{E51F004A-2C7F-4E04-BA2C-6B46B2598D5A}"/>
+              </a:ext>
+            </a:extLst>
+          </p:cNvPr>
+          <p:cNvSpPr>
+            <a:spLocks noGrp="1"/>
+          </p:cNvSpPr>
+          <p:nvPr>
+            <p:ph idx="1"/>
+          </p:nvPr>
+        </p:nvSpPr>
+        <p:spPr/>
+        <p:txBody>
+          <a:bodyPr>
+            <a:normAutofit/>
+          </a:bodyPr>
+          <a:lstStyle/>
+          <a:p>
+            <a:r>
+              <a:rPr lang="en-US" dirty="0"/>
+              <a:t>Data Quality</a:t>
+            </a:r>
+          </a:p>
+          <a:p>
+            <a:pPr lvl="2"/>
+            <a:r>
+              <a:rPr lang="en-US" dirty="0"/>
+              <a:t>Rows: 64,295</a:t>
+            </a:r>
+          </a:p>
+          <a:p>
+            <a:pPr lvl="2"/>
+            <a:r>
+              <a:rPr lang="en-US" dirty="0"/>
+              <a:t>Columns: 5</a:t>
+            </a:r>
+            <a:endParaRPr lang="en-AU" dirty="0"/>
+          </a:p>
+          <a:p>
+            <a:pPr lvl="1"/>
+            <a:r>
+              <a:rPr lang="en-GB" dirty="0"/>
+              <a:t>Variety</a:t>
+            </a:r>
+          </a:p>
+          <a:p>
+            <a:pPr lvl="2"/>
+            <a:r>
+              <a:rPr lang="en-GB" dirty="0"/>
+              <a:t>The dataset contains 1074 Google Play Mobile Apps with Reviews ranging from 30 -320 per app. </a:t>
+            </a:r>
+          </a:p>
+          <a:p>
+            <a:pPr lvl="2"/>
+            <a:r>
+              <a:rPr lang="en-GB" dirty="0"/>
+              <a:t>The sentiment labels have 3 categories, negative, neutral, and positive labelled in a set {-1, 0, 1}.</a:t>
+            </a:r>
+          </a:p>
+          <a:p>
+            <a:pPr lvl="2"/>
+            <a:r>
+              <a:rPr lang="en-GB" dirty="0"/>
+              <a:t>Polarity and Subjectivity scores allow more accurate models. But it is ignored in our case study because we are not doing information retrieval</a:t>
+            </a:r>
+            <a:endParaRPr lang="en-AU" dirty="0"/>
+          </a:p>
+          <a:p>
+            <a:pPr lvl="1"/>
+            <a:endParaRPr lang="en-US" dirty="0"/>
+          </a:p>
+          <a:p>
+            <a:pPr lvl="1"/>
+            <a:endParaRPr lang="en-US" dirty="0"/>
+          </a:p>
+          <a:p>
+            <a:pPr lvl="1"/>
+            <a:endParaRPr lang="en-AU" dirty="0"/>
+          </a:p>
+        </p:txBody>
+      </p:sp>
+    </p:spTree>
+    <p:extLst>
+      <p:ext uri="{BB962C8B-B14F-4D97-AF65-F5344CB8AC3E}">
+        <p14:creationId xmlns:p14="http://schemas.microsoft.com/office/powerpoint/2010/main" val="2505818061"/>
+      </p:ext>
+    </p:extLst>
+  </p:cSld>
+  <p:clrMapOvr>
+    <a:masterClrMapping/>
+  </p:clrMapOvr>
+</p:sld>
+</file>
+
+<file path=ppt/slides/slide9.xml><?xml version="1.0" encoding="utf-8"?>
+<p:sld xmlns:a="http://schemas.openxmlformats.org/drawingml/2006/main" xmlns:r="http://schemas.openxmlformats.org/officeDocument/2006/relationships" xmlns:p="http://schemas.openxmlformats.org/presentationml/2006/main">
+  <p:cSld>
+    <p:spTree>
+      <p:nvGrpSpPr>
+        <p:cNvPr id="1" name=""/>
+        <p:cNvGrpSpPr/>
+        <p:nvPr/>
+      </p:nvGrpSpPr>
+      <p:grpSpPr>
+        <a:xfrm>
+          <a:off x="0" y="0"/>
+          <a:ext cx="0" cy="0"/>
+          <a:chOff x="0" y="0"/>
+          <a:chExt cx="0" cy="0"/>
+        </a:xfrm>
+      </p:grpSpPr>
+      <p:sp>
+        <p:nvSpPr>
+          <p:cNvPr id="2" name="Title 1">
+            <a:extLst>
+              <a:ext uri="{FF2B5EF4-FFF2-40B4-BE49-F238E27FC236}">
                 <a16:creationId xmlns:a16="http://schemas.microsoft.com/office/drawing/2014/main" id="{E0C6F855-EBD0-4973-963B-C70AFAE00121}"/>
               </a:ext>
             </a:extLst>
@@ -10392,11 +11168,13 @@
           <a:p>
             <a:r>
               <a:rPr lang="en-US" dirty="0"/>
-              <a:t>Data exploration, analysis and </a:t>
-            </a:r>
-            <a:r>
-              <a:rPr lang="en-US" dirty="0" err="1"/>
-              <a:t>visualisation</a:t>
+              <a:t>Data exploration, analysis and visualization (EDA)</a:t>
+            </a:r>
+          </a:p>
+          <a:p>
+            <a:r>
+              <a:rPr lang="en-US" dirty="0"/>
+              <a:t>Negative Cloud</a:t>
             </a:r>
             <a:endParaRPr lang="en-AU" dirty="0"/>
           </a:p>
@@ -10431,8 +11209,8 @@
         </p:blipFill>
         <p:spPr bwMode="auto">
           <a:xfrm>
-            <a:off x="1148013" y="1900238"/>
-            <a:ext cx="8717882" cy="4427974"/>
+            <a:off x="1651247" y="2077356"/>
+            <a:ext cx="8596388" cy="4366265"/>
           </a:xfrm>
           <a:prstGeom prst="rect">
             <a:avLst/>
@@ -10453,94 +11231,6 @@
     <p:extLst>
       <p:ext uri="{BB962C8B-B14F-4D97-AF65-F5344CB8AC3E}">
         <p14:creationId xmlns:p14="http://schemas.microsoft.com/office/powerpoint/2010/main" val="463234992"/>
-      </p:ext>
-    </p:extLst>
-  </p:cSld>
-  <p:clrMapOvr>
-    <a:masterClrMapping/>
-  </p:clrMapOvr>
-</p:sld>
-</file>
-
-<file path=ppt/slides/slide9.xml><?xml version="1.0" encoding="utf-8"?>
-<p:sld xmlns:a="http://schemas.openxmlformats.org/drawingml/2006/main" xmlns:r="http://schemas.openxmlformats.org/officeDocument/2006/relationships" xmlns:p="http://schemas.openxmlformats.org/presentationml/2006/main">
-  <p:cSld>
-    <p:spTree>
-      <p:nvGrpSpPr>
-        <p:cNvPr id="1" name=""/>
-        <p:cNvGrpSpPr/>
-        <p:nvPr/>
-      </p:nvGrpSpPr>
-      <p:grpSpPr>
-        <a:xfrm>
-          <a:off x="0" y="0"/>
-          <a:ext cx="0" cy="0"/>
-          <a:chOff x="0" y="0"/>
-          <a:chExt cx="0" cy="0"/>
-        </a:xfrm>
-      </p:grpSpPr>
-      <p:sp>
-        <p:nvSpPr>
-          <p:cNvPr id="2" name="Title 1">
-            <a:extLst>
-              <a:ext uri="{FF2B5EF4-FFF2-40B4-BE49-F238E27FC236}">
-                <a16:creationId xmlns:a16="http://schemas.microsoft.com/office/drawing/2014/main" id="{5BB3B005-A5BB-4219-8223-8738E71E2F5B}"/>
-              </a:ext>
-            </a:extLst>
-          </p:cNvPr>
-          <p:cNvSpPr>
-            <a:spLocks noGrp="1"/>
-          </p:cNvSpPr>
-          <p:nvPr>
-            <p:ph type="title"/>
-          </p:nvPr>
-        </p:nvSpPr>
-        <p:spPr/>
-        <p:txBody>
-          <a:bodyPr/>
-          <a:lstStyle/>
-          <a:p>
-            <a:r>
-              <a:rPr lang="en-US"/>
-              <a:t>Overall process flow used</a:t>
-            </a:r>
-            <a:endParaRPr lang="en-AU" dirty="0"/>
-          </a:p>
-        </p:txBody>
-      </p:sp>
-      <p:pic>
-        <p:nvPicPr>
-          <p:cNvPr id="5" name="Content Placeholder 4">
-            <a:extLst>
-              <a:ext uri="{FF2B5EF4-FFF2-40B4-BE49-F238E27FC236}">
-                <a16:creationId xmlns:a16="http://schemas.microsoft.com/office/drawing/2014/main" id="{9A3E4B6E-2617-466B-B0C6-2A2A1017E261}"/>
-              </a:ext>
-            </a:extLst>
-          </p:cNvPr>
-          <p:cNvPicPr>
-            <a:picLocks noGrp="1" noChangeAspect="1"/>
-          </p:cNvPicPr>
-          <p:nvPr>
-            <p:ph idx="1"/>
-          </p:nvPr>
-        </p:nvPicPr>
-        <p:blipFill>
-          <a:blip r:embed="rId2"/>
-          <a:stretch>
-            <a:fillRect/>
-          </a:stretch>
-        </p:blipFill>
-        <p:spPr>
-          <a:xfrm>
-            <a:off x="3668920" y="2133600"/>
-            <a:ext cx="6755985" cy="3778250"/>
-          </a:xfrm>
-        </p:spPr>
-      </p:pic>
-    </p:spTree>
-    <p:extLst>
-      <p:ext uri="{BB962C8B-B14F-4D97-AF65-F5344CB8AC3E}">
-        <p14:creationId xmlns:p14="http://schemas.microsoft.com/office/powerpoint/2010/main" val="559979042"/>
       </p:ext>
     </p:extLst>
   </p:cSld>

</xml_diff>